<commit_message>
add data size in explore, pipeline slide aesthetic
</commit_message>
<xml_diff>
--- a/Team3 ML Slides.pptx
+++ b/Team3 ML Slides.pptx
@@ -5762,8 +5762,8 @@
           </a:p>
         </p:txBody>
       </p:sp>
-      <mc:AlternateContent xmlns:mc="http://schemas.openxmlformats.org/markup-compatibility/2006">
-        <mc:Choice xmlns:a14="http://schemas.microsoft.com/office/drawing/2010/main" Requires="a14">
+      <mc:AlternateContent xmlns:mc="http://schemas.openxmlformats.org/markup-compatibility/2006" xmlns:a14="http://schemas.microsoft.com/office/drawing/2010/main">
+        <mc:Choice Requires="a14">
           <p:sp>
             <p:nvSpPr>
               <p:cNvPr id="3" name="Content Placeholder 2">
@@ -6379,7 +6379,7 @@
             </p:txBody>
           </p:sp>
         </mc:Choice>
-        <mc:Fallback>
+        <mc:Fallback xmlns="">
           <p:sp>
             <p:nvSpPr>
               <p:cNvPr id="3" name="Content Placeholder 2">
@@ -6771,8 +6771,8 @@
           </p:txBody>
         </p:sp>
       </p:grpSp>
-      <mc:AlternateContent xmlns:mc="http://schemas.openxmlformats.org/markup-compatibility/2006">
-        <mc:Choice xmlns:a14="http://schemas.microsoft.com/office/drawing/2010/main" Requires="a14">
+      <mc:AlternateContent xmlns:mc="http://schemas.openxmlformats.org/markup-compatibility/2006" xmlns:a14="http://schemas.microsoft.com/office/drawing/2010/main">
+        <mc:Choice Requires="a14">
           <p:sp>
             <p:nvSpPr>
               <p:cNvPr id="13" name="TextBox 12">
@@ -7777,7 +7777,7 @@
             </p:txBody>
           </p:sp>
         </mc:Choice>
-        <mc:Fallback>
+        <mc:Fallback xmlns="">
           <p:sp>
             <p:nvSpPr>
               <p:cNvPr id="13" name="TextBox 12">
@@ -15184,7 +15184,21 @@
                 <a:latin typeface="Calibri" panose="020F0502020204030204" pitchFamily="34" charset="0"/>
                 <a:cs typeface="Calibri" panose="020F0502020204030204" pitchFamily="34" charset="0"/>
               </a:rPr>
-              <a:t>Use case: </a:t>
+              <a:t>Use </a:t>
+            </a:r>
+            <a:r>
+              <a:rPr lang="vi-VN" sz="2000" dirty="0">
+                <a:latin typeface="Calibri" panose="020F0502020204030204" pitchFamily="34" charset="0"/>
+                <a:cs typeface="Calibri" panose="020F0502020204030204" pitchFamily="34" charset="0"/>
+              </a:rPr>
+              <a:t>cases</a:t>
+            </a:r>
+            <a:r>
+              <a:rPr lang="en-US" sz="2000" dirty="0">
+                <a:latin typeface="Calibri" panose="020F0502020204030204" pitchFamily="34" charset="0"/>
+                <a:cs typeface="Calibri" panose="020F0502020204030204" pitchFamily="34" charset="0"/>
+              </a:rPr>
+              <a:t>: </a:t>
             </a:r>
           </a:p>
           <a:p>
@@ -15960,6 +15974,15 @@
               </a:rPr>
               <a:t>2.1 Features</a:t>
             </a:r>
+            <a:endParaRPr kumimoji="0" lang="vi-VN" altLang="ja-JP" sz="2400" b="0" i="0" u="none" strike="noStrike" cap="none" normalizeH="0" baseline="0" dirty="0">
+              <a:ln>
+                <a:noFill/>
+              </a:ln>
+              <a:solidFill>
+                <a:srgbClr val="FEFFFF"/>
+              </a:solidFill>
+              <a:effectLst/>
+            </a:endParaRPr>
           </a:p>
           <a:p>
             <a:pPr lvl="1" indent="-228600" fontAlgn="base">
@@ -15976,7 +15999,39 @@
               <a:buChar char="•"/>
             </a:pPr>
             <a:r>
-              <a:rPr kumimoji="0" lang="en-US" altLang="ja-JP" sz="2400" b="0" i="0" u="none" strike="noStrike" cap="none" normalizeH="0" baseline="0" dirty="0">
+              <a:rPr lang="vi-VN" altLang="ja-JP" sz="2000" dirty="0">
+                <a:solidFill>
+                  <a:srgbClr val="FEFFFF"/>
+                </a:solidFill>
+              </a:rPr>
+              <a:t>There are 19158 examples</a:t>
+            </a:r>
+            <a:endParaRPr kumimoji="0" lang="en-US" altLang="ja-JP" sz="2000" b="0" i="0" u="none" strike="noStrike" cap="none" normalizeH="0" baseline="0" dirty="0">
+              <a:ln>
+                <a:noFill/>
+              </a:ln>
+              <a:solidFill>
+                <a:srgbClr val="FEFFFF"/>
+              </a:solidFill>
+              <a:effectLst/>
+            </a:endParaRPr>
+          </a:p>
+          <a:p>
+            <a:pPr lvl="1" indent="-228600" fontAlgn="base">
+              <a:lnSpc>
+                <a:spcPct val="90000"/>
+              </a:lnSpc>
+              <a:spcBef>
+                <a:spcPct val="0"/>
+              </a:spcBef>
+              <a:spcAft>
+                <a:spcPts val="600"/>
+              </a:spcAft>
+              <a:buFont typeface="Arial" panose="020B0604020202020204" pitchFamily="34" charset="0"/>
+              <a:buChar char="•"/>
+            </a:pPr>
+            <a:r>
+              <a:rPr kumimoji="0" lang="en-US" altLang="ja-JP" sz="2000" b="0" i="0" u="none" strike="noStrike" cap="none" normalizeH="0" baseline="0" dirty="0">
                 <a:ln>
                   <a:noFill/>
                 </a:ln>
@@ -15985,7 +16040,31 @@
                 </a:solidFill>
                 <a:effectLst/>
               </a:rPr>
-              <a:t>Each example in the dataset is a vector of 13 x 1 vector with the following features:</a:t>
+              <a:t>Each example in the dataset is a 13 x 1 </a:t>
+            </a:r>
+            <a:r>
+              <a:rPr kumimoji="0" lang="vi-VN" altLang="ja-JP" sz="2000" b="0" i="0" u="none" strike="noStrike" cap="none" normalizeH="0" baseline="0" dirty="0">
+                <a:ln>
+                  <a:noFill/>
+                </a:ln>
+                <a:solidFill>
+                  <a:srgbClr val="FEFFFF"/>
+                </a:solidFill>
+                <a:effectLst/>
+              </a:rPr>
+              <a:t> </a:t>
+            </a:r>
+            <a:r>
+              <a:rPr kumimoji="0" lang="en-US" altLang="ja-JP" sz="2000" b="0" i="0" u="none" strike="noStrike" cap="none" normalizeH="0" baseline="0" dirty="0">
+                <a:ln>
+                  <a:noFill/>
+                </a:ln>
+                <a:solidFill>
+                  <a:srgbClr val="FEFFFF"/>
+                </a:solidFill>
+                <a:effectLst/>
+              </a:rPr>
+              <a:t>vector with the following features:</a:t>
             </a:r>
           </a:p>
         </p:txBody>
@@ -16006,7 +16085,7 @@
             <p:ph idx="1"/>
             <p:extLst>
               <p:ext uri="{D42A27DB-BD31-4B8C-83A1-F6EECF244321}">
-                <p14:modId xmlns:p14="http://schemas.microsoft.com/office/powerpoint/2010/main" val="3993506784"/>
+                <p14:modId xmlns:p14="http://schemas.microsoft.com/office/powerpoint/2010/main" val="1513453836"/>
               </p:ext>
             </p:extLst>
           </p:nvPr>
@@ -18163,7 +18242,7 @@
                           <a:ea typeface="Calibri" panose="020F0502020204030204" pitchFamily="34" charset="0"/>
                           <a:cs typeface="Times New Roman" panose="02020603050405020304" pitchFamily="18" charset="0"/>
                         </a:rPr>
-                        <a:t>Education level of the candidate t.</a:t>
+                        <a:t>Education level of the candidate.</a:t>
                       </a:r>
                       <a:endParaRPr lang="en-GB" sz="1050" b="0" i="0" u="none" strike="noStrike" dirty="0">
                         <a:effectLst/>
@@ -21538,271 +21617,147 @@
           </p:nvGrpSpPr>
           <p:grpSpPr>
             <a:xfrm>
-              <a:off x="5033029" y="1891901"/>
-              <a:ext cx="5072417" cy="3330184"/>
-              <a:chOff x="5033029" y="1891901"/>
-              <a:chExt cx="5072417" cy="3330184"/>
+              <a:off x="5279624" y="2019534"/>
+              <a:ext cx="5153572" cy="3347399"/>
+              <a:chOff x="5279624" y="2019534"/>
+              <a:chExt cx="5153572" cy="3347399"/>
             </a:xfrm>
           </p:grpSpPr>
-          <p:grpSp>
-            <p:nvGrpSpPr>
-              <p:cNvPr id="21" name="Group 20">
+          <p:sp>
+            <p:nvSpPr>
+              <p:cNvPr id="25" name="Rectangle: Rounded Corners 24">
                 <a:extLst>
                   <a:ext uri="{FF2B5EF4-FFF2-40B4-BE49-F238E27FC236}">
-                    <a16:creationId xmlns:a16="http://schemas.microsoft.com/office/drawing/2014/main" id="{971B9321-BF6B-4366-BABC-669FF69303AB}"/>
+                    <a16:creationId xmlns:a16="http://schemas.microsoft.com/office/drawing/2014/main" id="{A9AFF58E-EAE3-4DD8-AAD3-AD21AC6D8C45}"/>
                   </a:ext>
                 </a:extLst>
               </p:cNvPr>
-              <p:cNvGrpSpPr/>
+              <p:cNvSpPr/>
               <p:nvPr/>
-            </p:nvGrpSpPr>
-            <p:grpSpPr>
+            </p:nvSpPr>
+            <p:spPr>
               <a:xfrm>
-                <a:off x="6719977" y="1891901"/>
-                <a:ext cx="1546813" cy="889001"/>
-                <a:chOff x="9242" y="1346949"/>
-                <a:chExt cx="2762398" cy="1657439"/>
+                <a:off x="6665046" y="2019534"/>
+                <a:ext cx="1655871" cy="745207"/>
               </a:xfrm>
-            </p:grpSpPr>
-            <p:sp>
-              <p:nvSpPr>
-                <p:cNvPr id="25" name="Rectangle: Rounded Corners 24">
-                  <a:extLst>
-                    <a:ext uri="{FF2B5EF4-FFF2-40B4-BE49-F238E27FC236}">
-                      <a16:creationId xmlns:a16="http://schemas.microsoft.com/office/drawing/2014/main" id="{A9AFF58E-EAE3-4DD8-AAD3-AD21AC6D8C45}"/>
-                    </a:ext>
-                  </a:extLst>
-                </p:cNvPr>
-                <p:cNvSpPr/>
-                <p:nvPr/>
-              </p:nvSpPr>
-              <p:spPr>
-                <a:xfrm>
-                  <a:off x="9242" y="1346949"/>
-                  <a:ext cx="2762398" cy="1657439"/>
-                </a:xfrm>
-                <a:prstGeom prst="roundRect">
-                  <a:avLst>
-                    <a:gd name="adj" fmla="val 10000"/>
-                  </a:avLst>
-                </a:prstGeom>
-              </p:spPr>
-              <p:style>
-                <a:lnRef idx="2">
-                  <a:schemeClr val="lt1">
-                    <a:hueOff val="0"/>
-                    <a:satOff val="0"/>
-                    <a:lumOff val="0"/>
-                    <a:alphaOff val="0"/>
-                  </a:schemeClr>
-                </a:lnRef>
-                <a:fillRef idx="1">
-                  <a:schemeClr val="accent1">
-                    <a:hueOff val="0"/>
-                    <a:satOff val="0"/>
-                    <a:lumOff val="0"/>
-                    <a:alphaOff val="0"/>
-                  </a:schemeClr>
-                </a:fillRef>
-                <a:effectRef idx="0">
-                  <a:schemeClr val="accent1">
-                    <a:hueOff val="0"/>
-                    <a:satOff val="0"/>
-                    <a:lumOff val="0"/>
-                    <a:alphaOff val="0"/>
-                  </a:schemeClr>
-                </a:effectRef>
-                <a:fontRef idx="minor">
-                  <a:schemeClr val="lt1"/>
-                </a:fontRef>
-              </p:style>
-            </p:sp>
-            <p:sp>
-              <p:nvSpPr>
-                <p:cNvPr id="26" name="Rectangle: Rounded Corners 4">
-                  <a:extLst>
-                    <a:ext uri="{FF2B5EF4-FFF2-40B4-BE49-F238E27FC236}">
-                      <a16:creationId xmlns:a16="http://schemas.microsoft.com/office/drawing/2014/main" id="{34F87010-94E2-40D6-AB66-435BA3DFCD96}"/>
-                    </a:ext>
-                  </a:extLst>
-                </p:cNvPr>
-                <p:cNvSpPr txBox="1"/>
-                <p:nvPr/>
-              </p:nvSpPr>
-              <p:spPr>
-                <a:xfrm>
-                  <a:off x="57787" y="1395494"/>
-                  <a:ext cx="2665308" cy="1560349"/>
-                </a:xfrm>
-                <a:prstGeom prst="rect">
-                  <a:avLst/>
-                </a:prstGeom>
-              </p:spPr>
-              <p:style>
-                <a:lnRef idx="0">
-                  <a:scrgbClr r="0" g="0" b="0"/>
-                </a:lnRef>
-                <a:fillRef idx="0">
-                  <a:scrgbClr r="0" g="0" b="0"/>
-                </a:fillRef>
-                <a:effectRef idx="0">
-                  <a:scrgbClr r="0" g="0" b="0"/>
-                </a:effectRef>
-                <a:fontRef idx="minor">
-                  <a:schemeClr val="lt1"/>
-                </a:fontRef>
-              </p:style>
-              <p:txBody>
-                <a:bodyPr spcFirstLastPara="0" vert="horz" wrap="square" lIns="247650" tIns="247650" rIns="247650" bIns="247650" numCol="1" spcCol="1270" anchor="ctr" anchorCtr="0">
-                  <a:noAutofit/>
-                </a:bodyPr>
-                <a:lstStyle/>
-                <a:p>
-                  <a:pPr marL="0" lvl="0" indent="0" algn="ctr" defTabSz="2889250">
-                    <a:lnSpc>
-                      <a:spcPct val="90000"/>
-                    </a:lnSpc>
-                    <a:spcBef>
-                      <a:spcPct val="0"/>
-                    </a:spcBef>
-                    <a:spcAft>
-                      <a:spcPct val="35000"/>
-                    </a:spcAft>
-                    <a:buNone/>
-                  </a:pPr>
-                  <a:r>
-                    <a:rPr lang="vi-VN" kern="1200" dirty="0"/>
-                    <a:t>Standard Scaler</a:t>
-                  </a:r>
-                  <a:endParaRPr lang="en-US" kern="1200" dirty="0"/>
-                </a:p>
-              </p:txBody>
-            </p:sp>
-          </p:grpSp>
-          <p:grpSp>
-            <p:nvGrpSpPr>
-              <p:cNvPr id="27" name="Group 26">
+              <a:prstGeom prst="roundRect">
+                <a:avLst>
+                  <a:gd name="adj" fmla="val 10000"/>
+                </a:avLst>
+              </a:prstGeom>
+            </p:spPr>
+            <p:style>
+              <a:lnRef idx="2">
+                <a:schemeClr val="lt1">
+                  <a:hueOff val="0"/>
+                  <a:satOff val="0"/>
+                  <a:lumOff val="0"/>
+                  <a:alphaOff val="0"/>
+                </a:schemeClr>
+              </a:lnRef>
+              <a:fillRef idx="1">
+                <a:schemeClr val="accent1">
+                  <a:hueOff val="0"/>
+                  <a:satOff val="0"/>
+                  <a:lumOff val="0"/>
+                  <a:alphaOff val="0"/>
+                </a:schemeClr>
+              </a:fillRef>
+              <a:effectRef idx="0">
+                <a:schemeClr val="accent1">
+                  <a:hueOff val="0"/>
+                  <a:satOff val="0"/>
+                  <a:lumOff val="0"/>
+                  <a:alphaOff val="0"/>
+                </a:schemeClr>
+              </a:effectRef>
+              <a:fontRef idx="minor">
+                <a:schemeClr val="lt1"/>
+              </a:fontRef>
+            </p:style>
+            <p:txBody>
+              <a:bodyPr/>
+              <a:lstStyle/>
+              <a:p>
+                <a:pPr algn="ctr"/>
+                <a:r>
+                  <a:rPr lang="vi-VN" kern="1200" dirty="0"/>
+                  <a:t>Standard Scaler</a:t>
+                </a:r>
+                <a:endParaRPr lang="en-US" kern="1200" dirty="0"/>
+              </a:p>
+              <a:p>
+                <a:endParaRPr lang="en-US" dirty="0"/>
+              </a:p>
+            </p:txBody>
+          </p:sp>
+          <p:sp>
+            <p:nvSpPr>
+              <p:cNvPr id="28" name="Rectangle: Rounded Corners 27">
                 <a:extLst>
                   <a:ext uri="{FF2B5EF4-FFF2-40B4-BE49-F238E27FC236}">
-                    <a16:creationId xmlns:a16="http://schemas.microsoft.com/office/drawing/2014/main" id="{05671A7C-3E95-41DB-AEFA-0F3893DD5F59}"/>
+                    <a16:creationId xmlns:a16="http://schemas.microsoft.com/office/drawing/2014/main" id="{61AB6040-5A47-4738-A018-A59496B46D16}"/>
                   </a:ext>
                 </a:extLst>
               </p:cNvPr>
-              <p:cNvGrpSpPr/>
+              <p:cNvSpPr/>
               <p:nvPr/>
-            </p:nvGrpSpPr>
-            <p:grpSpPr>
+            </p:nvSpPr>
+            <p:spPr>
               <a:xfrm>
-                <a:off x="6022110" y="4138740"/>
-                <a:ext cx="1742018" cy="1083345"/>
-                <a:chOff x="-433588" y="1372826"/>
-                <a:chExt cx="2288474" cy="1657439"/>
+                <a:off x="6102582" y="4143856"/>
+                <a:ext cx="1455210" cy="1223077"/>
               </a:xfrm>
-            </p:grpSpPr>
-            <p:sp>
-              <p:nvSpPr>
-                <p:cNvPr id="28" name="Rectangle: Rounded Corners 27">
-                  <a:extLst>
-                    <a:ext uri="{FF2B5EF4-FFF2-40B4-BE49-F238E27FC236}">
-                      <a16:creationId xmlns:a16="http://schemas.microsoft.com/office/drawing/2014/main" id="{61AB6040-5A47-4738-A018-A59496B46D16}"/>
-                    </a:ext>
-                  </a:extLst>
-                </p:cNvPr>
-                <p:cNvSpPr/>
-                <p:nvPr/>
-              </p:nvSpPr>
-              <p:spPr>
-                <a:xfrm>
-                  <a:off x="-368960" y="1372826"/>
-                  <a:ext cx="2175303" cy="1657439"/>
-                </a:xfrm>
-                <a:prstGeom prst="roundRect">
-                  <a:avLst>
-                    <a:gd name="adj" fmla="val 10000"/>
-                  </a:avLst>
-                </a:prstGeom>
-              </p:spPr>
-              <p:style>
-                <a:lnRef idx="2">
-                  <a:schemeClr val="lt1">
-                    <a:hueOff val="0"/>
-                    <a:satOff val="0"/>
-                    <a:lumOff val="0"/>
-                    <a:alphaOff val="0"/>
-                  </a:schemeClr>
-                </a:lnRef>
-                <a:fillRef idx="1">
-                  <a:schemeClr val="accent1">
-                    <a:hueOff val="0"/>
-                    <a:satOff val="0"/>
-                    <a:lumOff val="0"/>
-                    <a:alphaOff val="0"/>
-                  </a:schemeClr>
-                </a:fillRef>
-                <a:effectRef idx="0">
-                  <a:schemeClr val="accent1">
-                    <a:hueOff val="0"/>
-                    <a:satOff val="0"/>
-                    <a:lumOff val="0"/>
-                    <a:alphaOff val="0"/>
-                  </a:schemeClr>
-                </a:effectRef>
-                <a:fontRef idx="minor">
-                  <a:schemeClr val="lt1"/>
-                </a:fontRef>
-              </p:style>
-            </p:sp>
-            <p:sp>
-              <p:nvSpPr>
-                <p:cNvPr id="29" name="Rectangle: Rounded Corners 4">
-                  <a:extLst>
-                    <a:ext uri="{FF2B5EF4-FFF2-40B4-BE49-F238E27FC236}">
-                      <a16:creationId xmlns:a16="http://schemas.microsoft.com/office/drawing/2014/main" id="{4C257249-9D94-4C60-AF00-A50D42DC00C2}"/>
-                    </a:ext>
-                  </a:extLst>
-                </p:cNvPr>
-                <p:cNvSpPr txBox="1"/>
-                <p:nvPr/>
-              </p:nvSpPr>
-              <p:spPr>
-                <a:xfrm>
-                  <a:off x="-433588" y="1421371"/>
-                  <a:ext cx="2288474" cy="1560348"/>
-                </a:xfrm>
-                <a:prstGeom prst="rect">
-                  <a:avLst/>
-                </a:prstGeom>
-              </p:spPr>
-              <p:style>
-                <a:lnRef idx="0">
-                  <a:scrgbClr r="0" g="0" b="0"/>
-                </a:lnRef>
-                <a:fillRef idx="0">
-                  <a:scrgbClr r="0" g="0" b="0"/>
-                </a:fillRef>
-                <a:effectRef idx="0">
-                  <a:scrgbClr r="0" g="0" b="0"/>
-                </a:effectRef>
-                <a:fontRef idx="minor">
-                  <a:schemeClr val="lt1"/>
-                </a:fontRef>
-              </p:style>
-              <p:txBody>
-                <a:bodyPr spcFirstLastPara="0" vert="horz" wrap="square" lIns="247650" tIns="247650" rIns="247650" bIns="247650" numCol="1" spcCol="1270" anchor="ctr" anchorCtr="0">
-                  <a:noAutofit/>
-                </a:bodyPr>
-                <a:lstStyle/>
-                <a:p>
-                  <a:pPr lvl="0"/>
-                  <a:r>
-                    <a:rPr lang="vi-VN" sz="1400" dirty="0"/>
-                    <a:t>Fill NaN with most frequent value, add NaN_indicator attribute</a:t>
-                  </a:r>
-                  <a:endParaRPr lang="en-US" sz="1400" dirty="0"/>
-                </a:p>
-              </p:txBody>
-            </p:sp>
-          </p:grpSp>
+              <a:prstGeom prst="roundRect">
+                <a:avLst>
+                  <a:gd name="adj" fmla="val 10000"/>
+                </a:avLst>
+              </a:prstGeom>
+            </p:spPr>
+            <p:style>
+              <a:lnRef idx="2">
+                <a:schemeClr val="lt1">
+                  <a:hueOff val="0"/>
+                  <a:satOff val="0"/>
+                  <a:lumOff val="0"/>
+                  <a:alphaOff val="0"/>
+                </a:schemeClr>
+              </a:lnRef>
+              <a:fillRef idx="1">
+                <a:schemeClr val="accent1">
+                  <a:hueOff val="0"/>
+                  <a:satOff val="0"/>
+                  <a:lumOff val="0"/>
+                  <a:alphaOff val="0"/>
+                </a:schemeClr>
+              </a:fillRef>
+              <a:effectRef idx="0">
+                <a:schemeClr val="accent1">
+                  <a:hueOff val="0"/>
+                  <a:satOff val="0"/>
+                  <a:lumOff val="0"/>
+                  <a:alphaOff val="0"/>
+                </a:schemeClr>
+              </a:effectRef>
+              <a:fontRef idx="minor">
+                <a:schemeClr val="lt1"/>
+              </a:fontRef>
+            </p:style>
+            <p:txBody>
+              <a:bodyPr/>
+              <a:lstStyle/>
+              <a:p>
+                <a:r>
+                  <a:rPr lang="vi-VN" sz="1400" dirty="0"/>
+                  <a:t>Fill NaN with most frequent category, add NaN_indicator attribute</a:t>
+                </a:r>
+                <a:endParaRPr lang="en-US" sz="1400" dirty="0"/>
+              </a:p>
+              <a:p>
+                <a:endParaRPr lang="en-US" sz="1400" dirty="0"/>
+              </a:p>
+            </p:txBody>
+          </p:sp>
           <p:sp>
             <p:nvSpPr>
               <p:cNvPr id="31" name="Arrow: Right 30">
@@ -21817,7 +21772,7 @@
             </p:nvSpPr>
             <p:spPr>
               <a:xfrm>
-                <a:off x="7764690" y="4443638"/>
+                <a:off x="7617394" y="4499465"/>
                 <a:ext cx="497202" cy="345106"/>
               </a:xfrm>
               <a:prstGeom prst="rightArrow">
@@ -21860,965 +21815,424 @@
               </a:fontRef>
             </p:style>
           </p:sp>
-          <p:grpSp>
-            <p:nvGrpSpPr>
-              <p:cNvPr id="43" name="Group 42">
+          <p:sp>
+            <p:nvSpPr>
+              <p:cNvPr id="44" name="Rectangle: Rounded Corners 43">
                 <a:extLst>
                   <a:ext uri="{FF2B5EF4-FFF2-40B4-BE49-F238E27FC236}">
-                    <a16:creationId xmlns:a16="http://schemas.microsoft.com/office/drawing/2014/main" id="{72063215-6D64-443C-AE1A-E95DD3ABFB16}"/>
+                    <a16:creationId xmlns:a16="http://schemas.microsoft.com/office/drawing/2014/main" id="{99849517-620E-48DF-B8C2-FA753B199312}"/>
                   </a:ext>
                 </a:extLst>
               </p:cNvPr>
-              <p:cNvGrpSpPr/>
+              <p:cNvSpPr/>
               <p:nvPr/>
-            </p:nvGrpSpPr>
-            <p:grpSpPr>
+            </p:nvSpPr>
+            <p:spPr>
               <a:xfrm>
-                <a:off x="8125622" y="4160508"/>
-                <a:ext cx="1330129" cy="911365"/>
-                <a:chOff x="-2102370" y="1297483"/>
-                <a:chExt cx="2665308" cy="1616498"/>
+                <a:off x="7755690" y="3128362"/>
+                <a:ext cx="1255917" cy="836925"/>
               </a:xfrm>
-            </p:grpSpPr>
-            <p:sp>
-              <p:nvSpPr>
-                <p:cNvPr id="44" name="Rectangle: Rounded Corners 43">
-                  <a:extLst>
-                    <a:ext uri="{FF2B5EF4-FFF2-40B4-BE49-F238E27FC236}">
-                      <a16:creationId xmlns:a16="http://schemas.microsoft.com/office/drawing/2014/main" id="{99849517-620E-48DF-B8C2-FA753B199312}"/>
-                    </a:ext>
-                  </a:extLst>
-                </p:cNvPr>
-                <p:cNvSpPr/>
-                <p:nvPr/>
-              </p:nvSpPr>
-              <p:spPr>
-                <a:xfrm>
-                  <a:off x="-1792151" y="1558809"/>
-                  <a:ext cx="1969362" cy="1111533"/>
-                </a:xfrm>
-                <a:prstGeom prst="roundRect">
-                  <a:avLst>
-                    <a:gd name="adj" fmla="val 10000"/>
-                  </a:avLst>
-                </a:prstGeom>
-              </p:spPr>
-              <p:style>
-                <a:lnRef idx="2">
-                  <a:schemeClr val="lt1">
-                    <a:hueOff val="0"/>
-                    <a:satOff val="0"/>
-                    <a:lumOff val="0"/>
-                    <a:alphaOff val="0"/>
-                  </a:schemeClr>
-                </a:lnRef>
-                <a:fillRef idx="1">
-                  <a:schemeClr val="accent1">
-                    <a:hueOff val="0"/>
-                    <a:satOff val="0"/>
-                    <a:lumOff val="0"/>
-                    <a:alphaOff val="0"/>
-                  </a:schemeClr>
-                </a:fillRef>
-                <a:effectRef idx="0">
-                  <a:schemeClr val="accent1">
-                    <a:hueOff val="0"/>
-                    <a:satOff val="0"/>
-                    <a:lumOff val="0"/>
-                    <a:alphaOff val="0"/>
-                  </a:schemeClr>
-                </a:effectRef>
-                <a:fontRef idx="minor">
-                  <a:schemeClr val="lt1"/>
-                </a:fontRef>
-              </p:style>
-            </p:sp>
-            <p:sp>
-              <p:nvSpPr>
-                <p:cNvPr id="45" name="Rectangle: Rounded Corners 4">
-                  <a:extLst>
-                    <a:ext uri="{FF2B5EF4-FFF2-40B4-BE49-F238E27FC236}">
-                      <a16:creationId xmlns:a16="http://schemas.microsoft.com/office/drawing/2014/main" id="{A301A550-1D93-49FA-99D9-0A63F33114F0}"/>
-                    </a:ext>
-                  </a:extLst>
-                </p:cNvPr>
-                <p:cNvSpPr txBox="1"/>
-                <p:nvPr/>
-              </p:nvSpPr>
-              <p:spPr>
-                <a:xfrm>
-                  <a:off x="-2102370" y="1297483"/>
-                  <a:ext cx="2665308" cy="1616498"/>
-                </a:xfrm>
-                <a:prstGeom prst="rect">
-                  <a:avLst/>
-                </a:prstGeom>
-              </p:spPr>
-              <p:style>
-                <a:lnRef idx="0">
-                  <a:scrgbClr r="0" g="0" b="0"/>
-                </a:lnRef>
-                <a:fillRef idx="0">
-                  <a:scrgbClr r="0" g="0" b="0"/>
-                </a:fillRef>
-                <a:effectRef idx="0">
-                  <a:scrgbClr r="0" g="0" b="0"/>
-                </a:effectRef>
-                <a:fontRef idx="minor">
-                  <a:schemeClr val="lt1"/>
-                </a:fontRef>
-              </p:style>
-              <p:txBody>
-                <a:bodyPr spcFirstLastPara="0" vert="horz" wrap="square" lIns="247650" tIns="247650" rIns="247650" bIns="247650" numCol="1" spcCol="1270" anchor="ctr" anchorCtr="0">
-                  <a:noAutofit/>
-                </a:bodyPr>
-                <a:lstStyle/>
-                <a:p>
-                  <a:pPr lvl="0"/>
-                  <a:r>
-                    <a:rPr lang="vi-VN" sz="1600" dirty="0"/>
-                    <a:t>One hot encoder</a:t>
-                  </a:r>
-                </a:p>
-              </p:txBody>
-            </p:sp>
-          </p:grpSp>
-          <p:grpSp>
-            <p:nvGrpSpPr>
-              <p:cNvPr id="46" name="Group 45">
+              <a:prstGeom prst="roundRect">
+                <a:avLst>
+                  <a:gd name="adj" fmla="val 10000"/>
+                </a:avLst>
+              </a:prstGeom>
+            </p:spPr>
+            <p:style>
+              <a:lnRef idx="2">
+                <a:schemeClr val="lt1">
+                  <a:hueOff val="0"/>
+                  <a:satOff val="0"/>
+                  <a:lumOff val="0"/>
+                  <a:alphaOff val="0"/>
+                </a:schemeClr>
+              </a:lnRef>
+              <a:fillRef idx="1">
+                <a:schemeClr val="accent1">
+                  <a:hueOff val="0"/>
+                  <a:satOff val="0"/>
+                  <a:lumOff val="0"/>
+                  <a:alphaOff val="0"/>
+                </a:schemeClr>
+              </a:fillRef>
+              <a:effectRef idx="0">
+                <a:schemeClr val="accent1">
+                  <a:hueOff val="0"/>
+                  <a:satOff val="0"/>
+                  <a:lumOff val="0"/>
+                  <a:alphaOff val="0"/>
+                </a:schemeClr>
+              </a:effectRef>
+              <a:fontRef idx="minor">
+                <a:schemeClr val="lt1"/>
+              </a:fontRef>
+            </p:style>
+            <p:txBody>
+              <a:bodyPr/>
+              <a:lstStyle/>
+              <a:p>
+                <a:r>
+                  <a:rPr lang="vi-VN" sz="1400" dirty="0"/>
+                  <a:t>Ordinal categorical to numeric</a:t>
+                </a:r>
+              </a:p>
+              <a:p>
+                <a:endParaRPr lang="en-US" sz="1400" dirty="0"/>
+              </a:p>
+            </p:txBody>
+          </p:sp>
+          <p:sp>
+            <p:nvSpPr>
+              <p:cNvPr id="47" name="Rectangle: Rounded Corners 46">
                 <a:extLst>
                   <a:ext uri="{FF2B5EF4-FFF2-40B4-BE49-F238E27FC236}">
-                    <a16:creationId xmlns:a16="http://schemas.microsoft.com/office/drawing/2014/main" id="{BDD057E4-AA7B-4CC2-BD2C-365F33D307E8}"/>
+                    <a16:creationId xmlns:a16="http://schemas.microsoft.com/office/drawing/2014/main" id="{CCE9278B-0FB1-43C7-A3D8-3DF5FDF45AB9}"/>
                   </a:ext>
                 </a:extLst>
               </p:cNvPr>
-              <p:cNvGrpSpPr/>
+              <p:cNvSpPr/>
               <p:nvPr/>
-            </p:nvGrpSpPr>
-            <p:grpSpPr>
+            </p:nvSpPr>
+            <p:spPr>
               <a:xfrm>
-                <a:off x="9042249" y="3261579"/>
-                <a:ext cx="1063197" cy="577356"/>
-                <a:chOff x="3936516" y="1454274"/>
-                <a:chExt cx="1693194" cy="1096778"/>
+                <a:off x="9407535" y="3241674"/>
+                <a:ext cx="1025661" cy="557323"/>
               </a:xfrm>
-            </p:grpSpPr>
-            <p:sp>
-              <p:nvSpPr>
-                <p:cNvPr id="47" name="Rectangle: Rounded Corners 46">
-                  <a:extLst>
-                    <a:ext uri="{FF2B5EF4-FFF2-40B4-BE49-F238E27FC236}">
-                      <a16:creationId xmlns:a16="http://schemas.microsoft.com/office/drawing/2014/main" id="{CCE9278B-0FB1-43C7-A3D8-3DF5FDF45AB9}"/>
-                    </a:ext>
-                  </a:extLst>
-                </p:cNvPr>
-                <p:cNvSpPr/>
-                <p:nvPr/>
-              </p:nvSpPr>
-              <p:spPr>
-                <a:xfrm>
-                  <a:off x="3988170" y="1454274"/>
-                  <a:ext cx="1540771" cy="1058718"/>
-                </a:xfrm>
-                <a:prstGeom prst="roundRect">
-                  <a:avLst>
-                    <a:gd name="adj" fmla="val 10000"/>
-                  </a:avLst>
-                </a:prstGeom>
-              </p:spPr>
-              <p:style>
-                <a:lnRef idx="2">
-                  <a:schemeClr val="lt1">
-                    <a:hueOff val="0"/>
-                    <a:satOff val="0"/>
-                    <a:lumOff val="0"/>
-                    <a:alphaOff val="0"/>
-                  </a:schemeClr>
-                </a:lnRef>
-                <a:fillRef idx="1">
-                  <a:schemeClr val="accent1">
-                    <a:hueOff val="0"/>
-                    <a:satOff val="0"/>
-                    <a:lumOff val="0"/>
-                    <a:alphaOff val="0"/>
-                  </a:schemeClr>
-                </a:fillRef>
-                <a:effectRef idx="0">
-                  <a:schemeClr val="accent1">
-                    <a:hueOff val="0"/>
-                    <a:satOff val="0"/>
-                    <a:lumOff val="0"/>
-                    <a:alphaOff val="0"/>
-                  </a:schemeClr>
-                </a:effectRef>
-                <a:fontRef idx="minor">
-                  <a:schemeClr val="lt1"/>
-                </a:fontRef>
-              </p:style>
-              <p:txBody>
-                <a:bodyPr/>
-                <a:lstStyle/>
-                <a:p>
-                  <a:endParaRPr lang="en-US" dirty="0"/>
-                </a:p>
-              </p:txBody>
-            </p:sp>
-            <p:sp>
-              <p:nvSpPr>
-                <p:cNvPr id="48" name="Rectangle: Rounded Corners 4">
-                  <a:extLst>
-                    <a:ext uri="{FF2B5EF4-FFF2-40B4-BE49-F238E27FC236}">
-                      <a16:creationId xmlns:a16="http://schemas.microsoft.com/office/drawing/2014/main" id="{3231854E-93BD-4325-BA73-7B5C81E99F96}"/>
-                    </a:ext>
-                  </a:extLst>
-                </p:cNvPr>
-                <p:cNvSpPr txBox="1"/>
-                <p:nvPr/>
-              </p:nvSpPr>
-              <p:spPr>
-                <a:xfrm>
-                  <a:off x="3936516" y="1482678"/>
-                  <a:ext cx="1693194" cy="1068374"/>
-                </a:xfrm>
-                <a:prstGeom prst="rect">
-                  <a:avLst/>
-                </a:prstGeom>
-              </p:spPr>
-              <p:style>
-                <a:lnRef idx="0">
-                  <a:scrgbClr r="0" g="0" b="0"/>
-                </a:lnRef>
-                <a:fillRef idx="0">
-                  <a:scrgbClr r="0" g="0" b="0"/>
-                </a:fillRef>
-                <a:effectRef idx="0">
-                  <a:scrgbClr r="0" g="0" b="0"/>
-                </a:effectRef>
-                <a:fontRef idx="minor">
-                  <a:schemeClr val="lt1"/>
-                </a:fontRef>
-              </p:style>
-              <p:txBody>
-                <a:bodyPr spcFirstLastPara="0" vert="horz" wrap="square" lIns="76200" tIns="76200" rIns="76200" bIns="76200" numCol="1" spcCol="1270" anchor="ctr" anchorCtr="0">
-                  <a:noAutofit/>
-                </a:bodyPr>
-                <a:lstStyle/>
-                <a:p>
-                  <a:pPr marL="0" lvl="0" indent="0" algn="ctr" defTabSz="889000">
-                    <a:lnSpc>
-                      <a:spcPct val="90000"/>
-                    </a:lnSpc>
-                    <a:spcBef>
-                      <a:spcPct val="0"/>
-                    </a:spcBef>
-                    <a:spcAft>
-                      <a:spcPct val="35000"/>
-                    </a:spcAft>
-                    <a:buNone/>
-                  </a:pPr>
-                  <a:r>
-                    <a:rPr lang="vi-VN" sz="1600" kern="1200" dirty="0"/>
-                    <a:t>Standard Scaler</a:t>
-                  </a:r>
-                  <a:endParaRPr lang="en-US" sz="1600" kern="1200" dirty="0"/>
-                </a:p>
-              </p:txBody>
-            </p:sp>
-          </p:grpSp>
-          <p:grpSp>
-            <p:nvGrpSpPr>
-              <p:cNvPr id="49" name="Group 48">
+              <a:prstGeom prst="roundRect">
+                <a:avLst>
+                  <a:gd name="adj" fmla="val 10000"/>
+                </a:avLst>
+              </a:prstGeom>
+            </p:spPr>
+            <p:style>
+              <a:lnRef idx="2">
+                <a:schemeClr val="lt1">
+                  <a:hueOff val="0"/>
+                  <a:satOff val="0"/>
+                  <a:lumOff val="0"/>
+                  <a:alphaOff val="0"/>
+                </a:schemeClr>
+              </a:lnRef>
+              <a:fillRef idx="1">
+                <a:schemeClr val="accent1">
+                  <a:hueOff val="0"/>
+                  <a:satOff val="0"/>
+                  <a:lumOff val="0"/>
+                  <a:alphaOff val="0"/>
+                </a:schemeClr>
+              </a:fillRef>
+              <a:effectRef idx="0">
+                <a:schemeClr val="accent1">
+                  <a:hueOff val="0"/>
+                  <a:satOff val="0"/>
+                  <a:lumOff val="0"/>
+                  <a:alphaOff val="0"/>
+                </a:schemeClr>
+              </a:effectRef>
+              <a:fontRef idx="minor">
+                <a:schemeClr val="lt1"/>
+              </a:fontRef>
+            </p:style>
+            <p:txBody>
+              <a:bodyPr/>
+              <a:lstStyle/>
+              <a:p>
+                <a:pPr algn="ctr"/>
+                <a:r>
+                  <a:rPr lang="vi-VN" sz="1400" kern="1200" dirty="0"/>
+                  <a:t>Standard Scaler</a:t>
+                </a:r>
+                <a:endParaRPr lang="en-US" sz="1400" kern="1200" dirty="0"/>
+              </a:p>
+              <a:p>
+                <a:pPr algn="ctr"/>
+                <a:endParaRPr lang="en-US" sz="1400" dirty="0"/>
+              </a:p>
+            </p:txBody>
+          </p:sp>
+          <p:sp>
+            <p:nvSpPr>
+              <p:cNvPr id="59" name="Arrow: Right 58">
                 <a:extLst>
                   <a:ext uri="{FF2B5EF4-FFF2-40B4-BE49-F238E27FC236}">
-                    <a16:creationId xmlns:a16="http://schemas.microsoft.com/office/drawing/2014/main" id="{0BE9AF8A-0A8C-4B95-97B4-6AC9FF4DFEAB}"/>
+                    <a16:creationId xmlns:a16="http://schemas.microsoft.com/office/drawing/2014/main" id="{C63F0A21-CF72-446F-AA07-D722D6B7EB5B}"/>
                   </a:ext>
                 </a:extLst>
               </p:cNvPr>
-              <p:cNvGrpSpPr/>
+              <p:cNvSpPr/>
               <p:nvPr/>
-            </p:nvGrpSpPr>
-            <p:grpSpPr>
-              <a:xfrm>
-                <a:off x="8465209" y="3322990"/>
-                <a:ext cx="585628" cy="411638"/>
-                <a:chOff x="3047880" y="1833131"/>
-                <a:chExt cx="585628" cy="685074"/>
+            </p:nvSpPr>
+            <p:spPr>
+              <a:xfrm rot="19825835">
+                <a:off x="5305730" y="2601576"/>
+                <a:ext cx="1352875" cy="442462"/>
               </a:xfrm>
-            </p:grpSpPr>
-            <p:sp>
-              <p:nvSpPr>
-                <p:cNvPr id="50" name="Arrow: Right 49">
-                  <a:extLst>
-                    <a:ext uri="{FF2B5EF4-FFF2-40B4-BE49-F238E27FC236}">
-                      <a16:creationId xmlns:a16="http://schemas.microsoft.com/office/drawing/2014/main" id="{620948FE-9ECE-454C-BE73-4045B88B8518}"/>
-                    </a:ext>
-                  </a:extLst>
-                </p:cNvPr>
-                <p:cNvSpPr/>
-                <p:nvPr/>
-              </p:nvSpPr>
-              <p:spPr>
-                <a:xfrm>
-                  <a:off x="3047880" y="1833131"/>
-                  <a:ext cx="585628" cy="685074"/>
-                </a:xfrm>
-                <a:prstGeom prst="rightArrow">
-                  <a:avLst>
-                    <a:gd name="adj1" fmla="val 60000"/>
-                    <a:gd name="adj2" fmla="val 50000"/>
-                  </a:avLst>
-                </a:prstGeom>
-              </p:spPr>
-              <p:style>
-                <a:lnRef idx="0">
-                  <a:schemeClr val="accent1">
-                    <a:tint val="60000"/>
-                    <a:hueOff val="0"/>
-                    <a:satOff val="0"/>
-                    <a:lumOff val="0"/>
-                    <a:alphaOff val="0"/>
-                  </a:schemeClr>
-                </a:lnRef>
-                <a:fillRef idx="1">
-                  <a:schemeClr val="accent1">
-                    <a:tint val="60000"/>
-                    <a:hueOff val="0"/>
-                    <a:satOff val="0"/>
-                    <a:lumOff val="0"/>
-                    <a:alphaOff val="0"/>
-                  </a:schemeClr>
-                </a:fillRef>
-                <a:effectRef idx="0">
-                  <a:schemeClr val="accent1">
-                    <a:tint val="60000"/>
-                    <a:hueOff val="0"/>
-                    <a:satOff val="0"/>
-                    <a:lumOff val="0"/>
-                    <a:alphaOff val="0"/>
-                  </a:schemeClr>
-                </a:effectRef>
-                <a:fontRef idx="minor">
-                  <a:schemeClr val="lt1"/>
-                </a:fontRef>
-              </p:style>
-            </p:sp>
-            <p:sp>
-              <p:nvSpPr>
-                <p:cNvPr id="51" name="Arrow: Right 6">
-                  <a:extLst>
-                    <a:ext uri="{FF2B5EF4-FFF2-40B4-BE49-F238E27FC236}">
-                      <a16:creationId xmlns:a16="http://schemas.microsoft.com/office/drawing/2014/main" id="{836BE12B-079D-426F-B56C-A450B9E67FD1}"/>
-                    </a:ext>
-                  </a:extLst>
-                </p:cNvPr>
-                <p:cNvSpPr txBox="1"/>
-                <p:nvPr/>
-              </p:nvSpPr>
-              <p:spPr>
-                <a:xfrm>
-                  <a:off x="3047880" y="1970146"/>
-                  <a:ext cx="409940" cy="411044"/>
-                </a:xfrm>
-                <a:prstGeom prst="rect">
-                  <a:avLst/>
-                </a:prstGeom>
-              </p:spPr>
-              <p:style>
-                <a:lnRef idx="0">
-                  <a:scrgbClr r="0" g="0" b="0"/>
-                </a:lnRef>
-                <a:fillRef idx="0">
-                  <a:scrgbClr r="0" g="0" b="0"/>
-                </a:fillRef>
-                <a:effectRef idx="0">
-                  <a:scrgbClr r="0" g="0" b="0"/>
-                </a:effectRef>
-                <a:fontRef idx="minor">
-                  <a:schemeClr val="lt1"/>
-                </a:fontRef>
-              </p:style>
-              <p:txBody>
-                <a:bodyPr spcFirstLastPara="0" vert="horz" wrap="square" lIns="0" tIns="0" rIns="0" bIns="0" numCol="1" spcCol="1270" anchor="ctr" anchorCtr="0">
-                  <a:noAutofit/>
-                </a:bodyPr>
-                <a:lstStyle/>
-                <a:p>
-                  <a:pPr marL="0" lvl="0" indent="0" algn="ctr" defTabSz="1289050">
-                    <a:lnSpc>
-                      <a:spcPct val="90000"/>
-                    </a:lnSpc>
-                    <a:spcBef>
-                      <a:spcPct val="0"/>
-                    </a:spcBef>
-                    <a:spcAft>
-                      <a:spcPct val="35000"/>
-                    </a:spcAft>
-                    <a:buNone/>
-                  </a:pPr>
-                  <a:endParaRPr lang="en-US" sz="2400" kern="1200" dirty="0"/>
-                </a:p>
-              </p:txBody>
-            </p:sp>
-          </p:grpSp>
-          <p:grpSp>
-            <p:nvGrpSpPr>
-              <p:cNvPr id="58" name="Group 57">
+              <a:prstGeom prst="rightArrow">
+                <a:avLst>
+                  <a:gd name="adj1" fmla="val 60000"/>
+                  <a:gd name="adj2" fmla="val 50000"/>
+                </a:avLst>
+              </a:prstGeom>
+            </p:spPr>
+            <p:style>
+              <a:lnRef idx="0">
+                <a:schemeClr val="accent1">
+                  <a:tint val="60000"/>
+                  <a:hueOff val="0"/>
+                  <a:satOff val="0"/>
+                  <a:lumOff val="0"/>
+                  <a:alphaOff val="0"/>
+                </a:schemeClr>
+              </a:lnRef>
+              <a:fillRef idx="1">
+                <a:schemeClr val="accent1">
+                  <a:tint val="60000"/>
+                  <a:hueOff val="0"/>
+                  <a:satOff val="0"/>
+                  <a:lumOff val="0"/>
+                  <a:alphaOff val="0"/>
+                </a:schemeClr>
+              </a:fillRef>
+              <a:effectRef idx="0">
+                <a:schemeClr val="accent1">
+                  <a:tint val="60000"/>
+                  <a:hueOff val="0"/>
+                  <a:satOff val="0"/>
+                  <a:lumOff val="0"/>
+                  <a:alphaOff val="0"/>
+                </a:schemeClr>
+              </a:effectRef>
+              <a:fontRef idx="minor">
+                <a:schemeClr val="lt1"/>
+              </a:fontRef>
+            </p:style>
+            <p:txBody>
+              <a:bodyPr/>
+              <a:lstStyle/>
+              <a:p>
+                <a:r>
+                  <a:rPr lang="vi-VN" sz="1200" kern="1200" dirty="0"/>
+                  <a:t>Numerical</a:t>
+                </a:r>
+                <a:endParaRPr lang="en-US" sz="1200" kern="1200" dirty="0"/>
+              </a:p>
+              <a:p>
+                <a:endParaRPr lang="en-US" sz="1200" dirty="0"/>
+              </a:p>
+            </p:txBody>
+          </p:sp>
+          <p:sp>
+            <p:nvSpPr>
+              <p:cNvPr id="62" name="Arrow: Right 61">
                 <a:extLst>
                   <a:ext uri="{FF2B5EF4-FFF2-40B4-BE49-F238E27FC236}">
-                    <a16:creationId xmlns:a16="http://schemas.microsoft.com/office/drawing/2014/main" id="{91ECE95A-CA8B-4877-9C90-9BD0D0966284}"/>
+                    <a16:creationId xmlns:a16="http://schemas.microsoft.com/office/drawing/2014/main" id="{43B7DDE7-BEF8-4E23-A25B-0E2919AC97F2}"/>
                   </a:ext>
                 </a:extLst>
               </p:cNvPr>
-              <p:cNvGrpSpPr/>
+              <p:cNvSpPr/>
               <p:nvPr/>
-            </p:nvGrpSpPr>
-            <p:grpSpPr>
-              <a:xfrm rot="20155762">
-                <a:off x="5193349" y="2543510"/>
-                <a:ext cx="1352875" cy="442462"/>
-                <a:chOff x="2976732" y="1887047"/>
-                <a:chExt cx="689769" cy="685074"/>
+            </p:nvSpPr>
+            <p:spPr>
+              <a:xfrm>
+                <a:off x="5420343" y="3286013"/>
+                <a:ext cx="839152" cy="461845"/>
               </a:xfrm>
-            </p:grpSpPr>
-            <p:sp>
-              <p:nvSpPr>
-                <p:cNvPr id="59" name="Arrow: Right 58">
-                  <a:extLst>
-                    <a:ext uri="{FF2B5EF4-FFF2-40B4-BE49-F238E27FC236}">
-                      <a16:creationId xmlns:a16="http://schemas.microsoft.com/office/drawing/2014/main" id="{C63F0A21-CF72-446F-AA07-D722D6B7EB5B}"/>
-                    </a:ext>
-                  </a:extLst>
-                </p:cNvPr>
-                <p:cNvSpPr/>
-                <p:nvPr/>
-              </p:nvSpPr>
-              <p:spPr>
-                <a:xfrm>
-                  <a:off x="2976732" y="1887047"/>
-                  <a:ext cx="689769" cy="685074"/>
-                </a:xfrm>
-                <a:prstGeom prst="rightArrow">
-                  <a:avLst>
-                    <a:gd name="adj1" fmla="val 60000"/>
-                    <a:gd name="adj2" fmla="val 50000"/>
-                  </a:avLst>
-                </a:prstGeom>
-              </p:spPr>
-              <p:style>
-                <a:lnRef idx="0">
-                  <a:schemeClr val="accent1">
-                    <a:tint val="60000"/>
-                    <a:hueOff val="0"/>
-                    <a:satOff val="0"/>
-                    <a:lumOff val="0"/>
-                    <a:alphaOff val="0"/>
-                  </a:schemeClr>
-                </a:lnRef>
-                <a:fillRef idx="1">
-                  <a:schemeClr val="accent1">
-                    <a:tint val="60000"/>
-                    <a:hueOff val="0"/>
-                    <a:satOff val="0"/>
-                    <a:lumOff val="0"/>
-                    <a:alphaOff val="0"/>
-                  </a:schemeClr>
-                </a:fillRef>
-                <a:effectRef idx="0">
-                  <a:schemeClr val="accent1">
-                    <a:tint val="60000"/>
-                    <a:hueOff val="0"/>
-                    <a:satOff val="0"/>
-                    <a:lumOff val="0"/>
-                    <a:alphaOff val="0"/>
-                  </a:schemeClr>
-                </a:effectRef>
-                <a:fontRef idx="minor">
-                  <a:schemeClr val="lt1"/>
-                </a:fontRef>
-              </p:style>
-            </p:sp>
-            <p:sp>
-              <p:nvSpPr>
-                <p:cNvPr id="60" name="Arrow: Right 6">
-                  <a:extLst>
-                    <a:ext uri="{FF2B5EF4-FFF2-40B4-BE49-F238E27FC236}">
-                      <a16:creationId xmlns:a16="http://schemas.microsoft.com/office/drawing/2014/main" id="{3CAE86F8-DDA3-45EA-9AEA-48EEB91D6133}"/>
-                    </a:ext>
-                  </a:extLst>
-                </p:cNvPr>
-                <p:cNvSpPr txBox="1"/>
-                <p:nvPr/>
-              </p:nvSpPr>
-              <p:spPr>
-                <a:xfrm>
-                  <a:off x="3023409" y="2030270"/>
-                  <a:ext cx="457777" cy="411044"/>
-                </a:xfrm>
-                <a:prstGeom prst="rect">
-                  <a:avLst/>
-                </a:prstGeom>
-              </p:spPr>
-              <p:style>
-                <a:lnRef idx="0">
-                  <a:scrgbClr r="0" g="0" b="0"/>
-                </a:lnRef>
-                <a:fillRef idx="0">
-                  <a:scrgbClr r="0" g="0" b="0"/>
-                </a:fillRef>
-                <a:effectRef idx="0">
-                  <a:scrgbClr r="0" g="0" b="0"/>
-                </a:effectRef>
-                <a:fontRef idx="minor">
-                  <a:schemeClr val="lt1"/>
-                </a:fontRef>
-              </p:style>
-              <p:txBody>
-                <a:bodyPr spcFirstLastPara="0" vert="horz" wrap="square" lIns="0" tIns="0" rIns="0" bIns="0" numCol="1" spcCol="1270" anchor="ctr" anchorCtr="0">
-                  <a:noAutofit/>
-                </a:bodyPr>
-                <a:lstStyle/>
-                <a:p>
-                  <a:pPr marL="0" lvl="0" indent="0" algn="ctr" defTabSz="1289050">
-                    <a:lnSpc>
-                      <a:spcPct val="90000"/>
-                    </a:lnSpc>
-                    <a:spcBef>
-                      <a:spcPct val="0"/>
-                    </a:spcBef>
-                    <a:spcAft>
-                      <a:spcPct val="35000"/>
-                    </a:spcAft>
-                    <a:buNone/>
-                  </a:pPr>
-                  <a:r>
-                    <a:rPr lang="vi-VN" sz="1400" kern="1200" dirty="0"/>
-                    <a:t>Numerical</a:t>
-                  </a:r>
-                  <a:endParaRPr lang="en-US" sz="1400" kern="1200" dirty="0"/>
-                </a:p>
-              </p:txBody>
-            </p:sp>
-          </p:grpSp>
-          <p:grpSp>
-            <p:nvGrpSpPr>
-              <p:cNvPr id="61" name="Group 60">
+              <a:prstGeom prst="rightArrow">
+                <a:avLst>
+                  <a:gd name="adj1" fmla="val 60000"/>
+                  <a:gd name="adj2" fmla="val 50000"/>
+                </a:avLst>
+              </a:prstGeom>
+            </p:spPr>
+            <p:style>
+              <a:lnRef idx="0">
+                <a:schemeClr val="accent1">
+                  <a:tint val="60000"/>
+                  <a:hueOff val="0"/>
+                  <a:satOff val="0"/>
+                  <a:lumOff val="0"/>
+                  <a:alphaOff val="0"/>
+                </a:schemeClr>
+              </a:lnRef>
+              <a:fillRef idx="1">
+                <a:schemeClr val="accent1">
+                  <a:tint val="60000"/>
+                  <a:hueOff val="0"/>
+                  <a:satOff val="0"/>
+                  <a:lumOff val="0"/>
+                  <a:alphaOff val="0"/>
+                </a:schemeClr>
+              </a:fillRef>
+              <a:effectRef idx="0">
+                <a:schemeClr val="accent1">
+                  <a:tint val="60000"/>
+                  <a:hueOff val="0"/>
+                  <a:satOff val="0"/>
+                  <a:lumOff val="0"/>
+                  <a:alphaOff val="0"/>
+                </a:schemeClr>
+              </a:effectRef>
+              <a:fontRef idx="minor">
+                <a:schemeClr val="lt1"/>
+              </a:fontRef>
+            </p:style>
+            <p:txBody>
+              <a:bodyPr/>
+              <a:lstStyle/>
+              <a:p>
+                <a:r>
+                  <a:rPr lang="en-US" sz="1200" kern="1200" dirty="0"/>
+                  <a:t>Ordina</a:t>
+                </a:r>
+                <a:r>
+                  <a:rPr lang="en-US" sz="1200" dirty="0"/>
+                  <a:t>l</a:t>
+                </a:r>
+                <a:endParaRPr lang="en-US" sz="1200" kern="1200" dirty="0"/>
+              </a:p>
+              <a:p>
+                <a:endParaRPr lang="en-US" sz="1200" dirty="0"/>
+              </a:p>
+            </p:txBody>
+          </p:sp>
+          <p:sp>
+            <p:nvSpPr>
+              <p:cNvPr id="65" name="Arrow: Right 64">
                 <a:extLst>
                   <a:ext uri="{FF2B5EF4-FFF2-40B4-BE49-F238E27FC236}">
-                    <a16:creationId xmlns:a16="http://schemas.microsoft.com/office/drawing/2014/main" id="{566ED9D2-E979-4E61-99D3-526F2A2A44D5}"/>
+                    <a16:creationId xmlns:a16="http://schemas.microsoft.com/office/drawing/2014/main" id="{D501DB95-D726-4248-8935-3118E2CDE231}"/>
                   </a:ext>
                 </a:extLst>
               </p:cNvPr>
-              <p:cNvGrpSpPr/>
+              <p:cNvSpPr/>
               <p:nvPr/>
-            </p:nvGrpSpPr>
-            <p:grpSpPr>
-              <a:xfrm>
-                <a:off x="5391286" y="3285541"/>
-                <a:ext cx="1329911" cy="461845"/>
-                <a:chOff x="3047237" y="1889338"/>
-                <a:chExt cx="585628" cy="685074"/>
+            </p:nvSpPr>
+            <p:spPr>
+              <a:xfrm rot="2438080">
+                <a:off x="5279624" y="3996430"/>
+                <a:ext cx="870671" cy="406237"/>
               </a:xfrm>
-            </p:grpSpPr>
-            <p:sp>
-              <p:nvSpPr>
-                <p:cNvPr id="62" name="Arrow: Right 61">
-                  <a:extLst>
-                    <a:ext uri="{FF2B5EF4-FFF2-40B4-BE49-F238E27FC236}">
-                      <a16:creationId xmlns:a16="http://schemas.microsoft.com/office/drawing/2014/main" id="{43B7DDE7-BEF8-4E23-A25B-0E2919AC97F2}"/>
-                    </a:ext>
-                  </a:extLst>
-                </p:cNvPr>
-                <p:cNvSpPr/>
-                <p:nvPr/>
-              </p:nvSpPr>
-              <p:spPr>
-                <a:xfrm>
-                  <a:off x="3047237" y="1889338"/>
-                  <a:ext cx="585628" cy="685074"/>
-                </a:xfrm>
-                <a:prstGeom prst="rightArrow">
-                  <a:avLst>
-                    <a:gd name="adj1" fmla="val 60000"/>
-                    <a:gd name="adj2" fmla="val 50000"/>
-                  </a:avLst>
-                </a:prstGeom>
-              </p:spPr>
-              <p:style>
-                <a:lnRef idx="0">
-                  <a:schemeClr val="accent1">
-                    <a:tint val="60000"/>
-                    <a:hueOff val="0"/>
-                    <a:satOff val="0"/>
-                    <a:lumOff val="0"/>
-                    <a:alphaOff val="0"/>
-                  </a:schemeClr>
-                </a:lnRef>
-                <a:fillRef idx="1">
-                  <a:schemeClr val="accent1">
-                    <a:tint val="60000"/>
-                    <a:hueOff val="0"/>
-                    <a:satOff val="0"/>
-                    <a:lumOff val="0"/>
-                    <a:alphaOff val="0"/>
-                  </a:schemeClr>
-                </a:fillRef>
-                <a:effectRef idx="0">
-                  <a:schemeClr val="accent1">
-                    <a:tint val="60000"/>
-                    <a:hueOff val="0"/>
-                    <a:satOff val="0"/>
-                    <a:lumOff val="0"/>
-                    <a:alphaOff val="0"/>
-                  </a:schemeClr>
-                </a:effectRef>
-                <a:fontRef idx="minor">
-                  <a:schemeClr val="lt1"/>
-                </a:fontRef>
-              </p:style>
-            </p:sp>
-            <p:sp>
-              <p:nvSpPr>
-                <p:cNvPr id="63" name="Arrow: Right 6">
-                  <a:extLst>
-                    <a:ext uri="{FF2B5EF4-FFF2-40B4-BE49-F238E27FC236}">
-                      <a16:creationId xmlns:a16="http://schemas.microsoft.com/office/drawing/2014/main" id="{D4B0E8E6-E735-498D-A9B6-8B35EB6AEDCA}"/>
-                    </a:ext>
-                  </a:extLst>
-                </p:cNvPr>
-                <p:cNvSpPr txBox="1"/>
-                <p:nvPr/>
-              </p:nvSpPr>
-              <p:spPr>
-                <a:xfrm>
-                  <a:off x="3047701" y="2055815"/>
-                  <a:ext cx="409940" cy="411044"/>
-                </a:xfrm>
-                <a:prstGeom prst="rect">
-                  <a:avLst/>
-                </a:prstGeom>
-              </p:spPr>
-              <p:style>
-                <a:lnRef idx="0">
-                  <a:scrgbClr r="0" g="0" b="0"/>
-                </a:lnRef>
-                <a:fillRef idx="0">
-                  <a:scrgbClr r="0" g="0" b="0"/>
-                </a:fillRef>
-                <a:effectRef idx="0">
-                  <a:scrgbClr r="0" g="0" b="0"/>
-                </a:effectRef>
-                <a:fontRef idx="minor">
-                  <a:schemeClr val="lt1"/>
-                </a:fontRef>
-              </p:style>
-              <p:txBody>
-                <a:bodyPr spcFirstLastPara="0" vert="horz" wrap="square" lIns="0" tIns="0" rIns="0" bIns="0" numCol="1" spcCol="1270" anchor="ctr" anchorCtr="0">
-                  <a:noAutofit/>
-                </a:bodyPr>
-                <a:lstStyle/>
-                <a:p>
-                  <a:pPr marL="0" lvl="0" indent="0" algn="ctr" defTabSz="1289050">
-                    <a:lnSpc>
-                      <a:spcPct val="90000"/>
-                    </a:lnSpc>
-                    <a:spcBef>
-                      <a:spcPct val="0"/>
-                    </a:spcBef>
-                    <a:spcAft>
-                      <a:spcPct val="35000"/>
-                    </a:spcAft>
-                    <a:buNone/>
-                  </a:pPr>
-                  <a:r>
-                    <a:rPr lang="vi-VN" sz="1400" kern="1200" dirty="0"/>
-                    <a:t>Ordinal</a:t>
-                  </a:r>
-                  <a:endParaRPr lang="en-US" sz="1400" kern="1200" dirty="0"/>
-                </a:p>
-              </p:txBody>
-            </p:sp>
-          </p:grpSp>
-          <p:grpSp>
-            <p:nvGrpSpPr>
-              <p:cNvPr id="64" name="Group 63">
+              <a:prstGeom prst="rightArrow">
+                <a:avLst>
+                  <a:gd name="adj1" fmla="val 60000"/>
+                  <a:gd name="adj2" fmla="val 50000"/>
+                </a:avLst>
+              </a:prstGeom>
+            </p:spPr>
+            <p:style>
+              <a:lnRef idx="0">
+                <a:schemeClr val="accent1">
+                  <a:tint val="60000"/>
+                  <a:hueOff val="0"/>
+                  <a:satOff val="0"/>
+                  <a:lumOff val="0"/>
+                  <a:alphaOff val="0"/>
+                </a:schemeClr>
+              </a:lnRef>
+              <a:fillRef idx="1">
+                <a:schemeClr val="accent1">
+                  <a:tint val="60000"/>
+                  <a:hueOff val="0"/>
+                  <a:satOff val="0"/>
+                  <a:lumOff val="0"/>
+                  <a:alphaOff val="0"/>
+                </a:schemeClr>
+              </a:fillRef>
+              <a:effectRef idx="0">
+                <a:schemeClr val="accent1">
+                  <a:tint val="60000"/>
+                  <a:hueOff val="0"/>
+                  <a:satOff val="0"/>
+                  <a:lumOff val="0"/>
+                  <a:alphaOff val="0"/>
+                </a:schemeClr>
+              </a:effectRef>
+              <a:fontRef idx="minor">
+                <a:schemeClr val="lt1"/>
+              </a:fontRef>
+            </p:style>
+            <p:txBody>
+              <a:bodyPr/>
+              <a:lstStyle/>
+              <a:p>
+                <a:r>
+                  <a:rPr lang="en-US" sz="1200" kern="1200" dirty="0"/>
+                  <a:t>Nominal</a:t>
+                </a:r>
+              </a:p>
+              <a:p>
+                <a:endParaRPr lang="en-US" sz="1200" dirty="0"/>
+              </a:p>
+            </p:txBody>
+          </p:sp>
+          <p:sp>
+            <p:nvSpPr>
+              <p:cNvPr id="71" name="Rectangle: Rounded Corners 70">
                 <a:extLst>
                   <a:ext uri="{FF2B5EF4-FFF2-40B4-BE49-F238E27FC236}">
-                    <a16:creationId xmlns:a16="http://schemas.microsoft.com/office/drawing/2014/main" id="{AA21247E-D5C7-4A24-8215-1BD675CB58D9}"/>
+                    <a16:creationId xmlns:a16="http://schemas.microsoft.com/office/drawing/2014/main" id="{570ADCF5-3FE0-41EF-9BB3-F24C008ACEEB}"/>
                   </a:ext>
                 </a:extLst>
               </p:cNvPr>
-              <p:cNvGrpSpPr/>
+              <p:cNvSpPr/>
               <p:nvPr/>
-            </p:nvGrpSpPr>
-            <p:grpSpPr>
-              <a:xfrm rot="1988169">
-                <a:off x="5033029" y="4098035"/>
-                <a:ext cx="1108052" cy="436841"/>
-                <a:chOff x="2969275" y="2112388"/>
-                <a:chExt cx="517321" cy="640972"/>
+            </p:nvSpPr>
+            <p:spPr>
+              <a:xfrm>
+                <a:off x="6293148" y="3010349"/>
+                <a:ext cx="1042278" cy="1019889"/>
               </a:xfrm>
-            </p:grpSpPr>
-            <p:sp>
-              <p:nvSpPr>
-                <p:cNvPr id="65" name="Arrow: Right 64">
-                  <a:extLst>
-                    <a:ext uri="{FF2B5EF4-FFF2-40B4-BE49-F238E27FC236}">
-                      <a16:creationId xmlns:a16="http://schemas.microsoft.com/office/drawing/2014/main" id="{D501DB95-D726-4248-8935-3118E2CDE231}"/>
-                    </a:ext>
-                  </a:extLst>
-                </p:cNvPr>
-                <p:cNvSpPr/>
-                <p:nvPr/>
-              </p:nvSpPr>
-              <p:spPr>
-                <a:xfrm rot="449911">
-                  <a:off x="2969275" y="2112388"/>
-                  <a:ext cx="517321" cy="640972"/>
-                </a:xfrm>
-                <a:prstGeom prst="rightArrow">
-                  <a:avLst>
-                    <a:gd name="adj1" fmla="val 60000"/>
-                    <a:gd name="adj2" fmla="val 50000"/>
-                  </a:avLst>
-                </a:prstGeom>
-              </p:spPr>
-              <p:style>
-                <a:lnRef idx="0">
-                  <a:schemeClr val="accent1">
-                    <a:tint val="60000"/>
-                    <a:hueOff val="0"/>
-                    <a:satOff val="0"/>
-                    <a:lumOff val="0"/>
-                    <a:alphaOff val="0"/>
-                  </a:schemeClr>
-                </a:lnRef>
-                <a:fillRef idx="1">
-                  <a:schemeClr val="accent1">
-                    <a:tint val="60000"/>
-                    <a:hueOff val="0"/>
-                    <a:satOff val="0"/>
-                    <a:lumOff val="0"/>
-                    <a:alphaOff val="0"/>
-                  </a:schemeClr>
-                </a:fillRef>
-                <a:effectRef idx="0">
-                  <a:schemeClr val="accent1">
-                    <a:tint val="60000"/>
-                    <a:hueOff val="0"/>
-                    <a:satOff val="0"/>
-                    <a:lumOff val="0"/>
-                    <a:alphaOff val="0"/>
-                  </a:schemeClr>
-                </a:effectRef>
-                <a:fontRef idx="minor">
-                  <a:schemeClr val="lt1"/>
-                </a:fontRef>
-              </p:style>
-              <p:txBody>
-                <a:bodyPr/>
-                <a:lstStyle/>
-                <a:p>
-                  <a:endParaRPr lang="en-US" dirty="0"/>
-                </a:p>
-              </p:txBody>
-            </p:sp>
-            <p:sp>
-              <p:nvSpPr>
-                <p:cNvPr id="66" name="Arrow: Right 6">
-                  <a:extLst>
-                    <a:ext uri="{FF2B5EF4-FFF2-40B4-BE49-F238E27FC236}">
-                      <a16:creationId xmlns:a16="http://schemas.microsoft.com/office/drawing/2014/main" id="{ACBAC05D-9EB5-4101-BADA-1C793843F8D3}"/>
-                    </a:ext>
-                  </a:extLst>
-                </p:cNvPr>
-                <p:cNvSpPr txBox="1"/>
-                <p:nvPr/>
-              </p:nvSpPr>
-              <p:spPr>
-                <a:xfrm rot="423929">
-                  <a:off x="3001248" y="2246082"/>
-                  <a:ext cx="409940" cy="411043"/>
-                </a:xfrm>
-                <a:prstGeom prst="rect">
-                  <a:avLst/>
-                </a:prstGeom>
-              </p:spPr>
-              <p:style>
-                <a:lnRef idx="0">
-                  <a:scrgbClr r="0" g="0" b="0"/>
-                </a:lnRef>
-                <a:fillRef idx="0">
-                  <a:scrgbClr r="0" g="0" b="0"/>
-                </a:fillRef>
-                <a:effectRef idx="0">
-                  <a:scrgbClr r="0" g="0" b="0"/>
-                </a:effectRef>
-                <a:fontRef idx="minor">
-                  <a:schemeClr val="lt1"/>
-                </a:fontRef>
-              </p:style>
-              <p:txBody>
-                <a:bodyPr spcFirstLastPara="0" vert="horz" wrap="square" lIns="0" tIns="0" rIns="0" bIns="0" numCol="1" spcCol="1270" anchor="ctr" anchorCtr="0">
-                  <a:noAutofit/>
-                </a:bodyPr>
-                <a:lstStyle/>
-                <a:p>
-                  <a:pPr marL="0" lvl="0" indent="0" algn="ctr" defTabSz="1289050">
-                    <a:lnSpc>
-                      <a:spcPct val="90000"/>
-                    </a:lnSpc>
-                    <a:spcBef>
-                      <a:spcPct val="0"/>
-                    </a:spcBef>
-                    <a:spcAft>
-                      <a:spcPct val="35000"/>
-                    </a:spcAft>
-                    <a:buNone/>
-                  </a:pPr>
-                  <a:r>
-                    <a:rPr lang="vi-VN" sz="1200" kern="1200" dirty="0"/>
-                    <a:t>Categorical</a:t>
-                  </a:r>
-                  <a:endParaRPr lang="en-US" sz="1200" kern="1200" dirty="0"/>
-                </a:p>
-              </p:txBody>
-            </p:sp>
-          </p:grpSp>
-          <p:grpSp>
-            <p:nvGrpSpPr>
-              <p:cNvPr id="70" name="Group 69">
-                <a:extLst>
-                  <a:ext uri="{FF2B5EF4-FFF2-40B4-BE49-F238E27FC236}">
-                    <a16:creationId xmlns:a16="http://schemas.microsoft.com/office/drawing/2014/main" id="{A2CF79CF-77CF-46AD-A32A-EF1CAFE5E478}"/>
-                  </a:ext>
-                </a:extLst>
-              </p:cNvPr>
-              <p:cNvGrpSpPr/>
-              <p:nvPr/>
-            </p:nvGrpSpPr>
-            <p:grpSpPr>
-              <a:xfrm>
-                <a:off x="6801934" y="2995491"/>
-                <a:ext cx="1620502" cy="889001"/>
-                <a:chOff x="91698" y="1192080"/>
-                <a:chExt cx="2102775" cy="1471892"/>
-              </a:xfrm>
-            </p:grpSpPr>
-            <p:sp>
-              <p:nvSpPr>
-                <p:cNvPr id="71" name="Rectangle: Rounded Corners 70">
-                  <a:extLst>
-                    <a:ext uri="{FF2B5EF4-FFF2-40B4-BE49-F238E27FC236}">
-                      <a16:creationId xmlns:a16="http://schemas.microsoft.com/office/drawing/2014/main" id="{570ADCF5-3FE0-41EF-9BB3-F24C008ACEEB}"/>
-                    </a:ext>
-                  </a:extLst>
-                </p:cNvPr>
-                <p:cNvSpPr/>
-                <p:nvPr/>
-              </p:nvSpPr>
-              <p:spPr>
-                <a:xfrm>
-                  <a:off x="91698" y="1192080"/>
-                  <a:ext cx="2102775" cy="1471892"/>
-                </a:xfrm>
-                <a:prstGeom prst="roundRect">
-                  <a:avLst>
-                    <a:gd name="adj" fmla="val 10000"/>
-                  </a:avLst>
-                </a:prstGeom>
-              </p:spPr>
-              <p:style>
-                <a:lnRef idx="2">
-                  <a:schemeClr val="lt1">
-                    <a:hueOff val="0"/>
-                    <a:satOff val="0"/>
-                    <a:lumOff val="0"/>
-                    <a:alphaOff val="0"/>
-                  </a:schemeClr>
-                </a:lnRef>
-                <a:fillRef idx="1">
-                  <a:schemeClr val="accent1">
-                    <a:hueOff val="0"/>
-                    <a:satOff val="0"/>
-                    <a:lumOff val="0"/>
-                    <a:alphaOff val="0"/>
-                  </a:schemeClr>
-                </a:fillRef>
-                <a:effectRef idx="0">
-                  <a:schemeClr val="accent1">
-                    <a:hueOff val="0"/>
-                    <a:satOff val="0"/>
-                    <a:lumOff val="0"/>
-                    <a:alphaOff val="0"/>
-                  </a:schemeClr>
-                </a:effectRef>
-                <a:fontRef idx="minor">
-                  <a:schemeClr val="lt1"/>
-                </a:fontRef>
-              </p:style>
-            </p:sp>
-            <p:sp>
-              <p:nvSpPr>
-                <p:cNvPr id="72" name="Rectangle: Rounded Corners 4">
-                  <a:extLst>
-                    <a:ext uri="{FF2B5EF4-FFF2-40B4-BE49-F238E27FC236}">
-                      <a16:creationId xmlns:a16="http://schemas.microsoft.com/office/drawing/2014/main" id="{7C953C8C-6EE5-40A9-930C-E9370D4DC3CD}"/>
-                    </a:ext>
-                  </a:extLst>
-                </p:cNvPr>
-                <p:cNvSpPr txBox="1"/>
-                <p:nvPr/>
-              </p:nvSpPr>
-              <p:spPr>
-                <a:xfrm>
-                  <a:off x="134808" y="1235190"/>
-                  <a:ext cx="2016555" cy="1385672"/>
-                </a:xfrm>
-                <a:prstGeom prst="rect">
-                  <a:avLst/>
-                </a:prstGeom>
-              </p:spPr>
-              <p:style>
-                <a:lnRef idx="0">
-                  <a:scrgbClr r="0" g="0" b="0"/>
-                </a:lnRef>
-                <a:fillRef idx="0">
-                  <a:scrgbClr r="0" g="0" b="0"/>
-                </a:fillRef>
-                <a:effectRef idx="0">
-                  <a:scrgbClr r="0" g="0" b="0"/>
-                </a:effectRef>
-                <a:fontRef idx="minor">
-                  <a:schemeClr val="lt1"/>
-                </a:fontRef>
-              </p:style>
-              <p:txBody>
-                <a:bodyPr spcFirstLastPara="0" vert="horz" wrap="square" lIns="76200" tIns="76200" rIns="76200" bIns="76200" numCol="1" spcCol="1270" anchor="ctr" anchorCtr="0">
-                  <a:noAutofit/>
-                </a:bodyPr>
-                <a:lstStyle/>
-                <a:p>
-                  <a:pPr marL="0" lvl="0" indent="0" algn="ctr" defTabSz="889000">
-                    <a:lnSpc>
-                      <a:spcPct val="90000"/>
-                    </a:lnSpc>
-                    <a:spcBef>
-                      <a:spcPct val="0"/>
-                    </a:spcBef>
-                    <a:spcAft>
-                      <a:spcPct val="35000"/>
-                    </a:spcAft>
-                    <a:buNone/>
-                  </a:pPr>
-                  <a:r>
-                    <a:rPr lang="vi-VN" sz="1600" kern="1200" dirty="0"/>
-                    <a:t>Fill NaN with most frequent value</a:t>
-                  </a:r>
-                  <a:endParaRPr lang="en-US" sz="1600" kern="1200" dirty="0"/>
-                </a:p>
-              </p:txBody>
-            </p:sp>
-          </p:grpSp>
+              <a:prstGeom prst="roundRect">
+                <a:avLst>
+                  <a:gd name="adj" fmla="val 10000"/>
+                </a:avLst>
+              </a:prstGeom>
+            </p:spPr>
+            <p:style>
+              <a:lnRef idx="2">
+                <a:schemeClr val="lt1">
+                  <a:hueOff val="0"/>
+                  <a:satOff val="0"/>
+                  <a:lumOff val="0"/>
+                  <a:alphaOff val="0"/>
+                </a:schemeClr>
+              </a:lnRef>
+              <a:fillRef idx="1">
+                <a:schemeClr val="accent1">
+                  <a:hueOff val="0"/>
+                  <a:satOff val="0"/>
+                  <a:lumOff val="0"/>
+                  <a:alphaOff val="0"/>
+                </a:schemeClr>
+              </a:fillRef>
+              <a:effectRef idx="0">
+                <a:schemeClr val="accent1">
+                  <a:hueOff val="0"/>
+                  <a:satOff val="0"/>
+                  <a:lumOff val="0"/>
+                  <a:alphaOff val="0"/>
+                </a:schemeClr>
+              </a:effectRef>
+              <a:fontRef idx="minor">
+                <a:schemeClr val="lt1"/>
+              </a:fontRef>
+            </p:style>
+            <p:txBody>
+              <a:bodyPr/>
+              <a:lstStyle/>
+              <a:p>
+                <a:r>
+                  <a:rPr lang="vi-VN" sz="1400" kern="1200" dirty="0"/>
+                  <a:t>Fill NaN with most frequent value</a:t>
+                </a:r>
+                <a:endParaRPr lang="en-US" sz="1400" kern="1200" dirty="0"/>
+              </a:p>
+              <a:p>
+                <a:endParaRPr lang="en-US" sz="1400" dirty="0"/>
+              </a:p>
+            </p:txBody>
+          </p:sp>
         </p:grpSp>
       </p:grpSp>
       <p:sp>
@@ -22967,366 +22381,227 @@
           </a:p>
         </p:txBody>
       </p:sp>
-      <p:grpSp>
-        <p:nvGrpSpPr>
-          <p:cNvPr id="77" name="Group 76">
+      <p:sp>
+        <p:nvSpPr>
+          <p:cNvPr id="78" name="Rectangle: Rounded Corners 77">
             <a:extLst>
               <a:ext uri="{FF2B5EF4-FFF2-40B4-BE49-F238E27FC236}">
-                <a16:creationId xmlns:a16="http://schemas.microsoft.com/office/drawing/2014/main" id="{EDC79CB9-217D-40C0-B487-4308D49F74A9}"/>
+                <a16:creationId xmlns:a16="http://schemas.microsoft.com/office/drawing/2014/main" id="{8A486791-3AFD-48FD-B76F-E287842D04BF}"/>
               </a:ext>
             </a:extLst>
           </p:cNvPr>
-          <p:cNvGrpSpPr/>
+          <p:cNvSpPr/>
           <p:nvPr/>
-        </p:nvGrpSpPr>
-        <p:grpSpPr>
+        </p:nvSpPr>
+        <p:spPr>
           <a:xfrm>
             <a:off x="2003495" y="2685107"/>
             <a:ext cx="1198210" cy="868793"/>
-            <a:chOff x="9242" y="1346949"/>
-            <a:chExt cx="2762398" cy="1657439"/>
           </a:xfrm>
-        </p:grpSpPr>
-        <p:sp>
-          <p:nvSpPr>
-            <p:cNvPr id="78" name="Rectangle: Rounded Corners 77">
-              <a:extLst>
-                <a:ext uri="{FF2B5EF4-FFF2-40B4-BE49-F238E27FC236}">
-                  <a16:creationId xmlns:a16="http://schemas.microsoft.com/office/drawing/2014/main" id="{8A486791-3AFD-48FD-B76F-E287842D04BF}"/>
-                </a:ext>
-              </a:extLst>
-            </p:cNvPr>
-            <p:cNvSpPr/>
-            <p:nvPr/>
-          </p:nvSpPr>
-          <p:spPr>
-            <a:xfrm>
-              <a:off x="9242" y="1346949"/>
-              <a:ext cx="2762398" cy="1657439"/>
-            </a:xfrm>
-            <a:prstGeom prst="roundRect">
-              <a:avLst>
-                <a:gd name="adj" fmla="val 10000"/>
-              </a:avLst>
-            </a:prstGeom>
-          </p:spPr>
-          <p:style>
-            <a:lnRef idx="2">
-              <a:schemeClr val="accent4"/>
-            </a:lnRef>
-            <a:fillRef idx="1">
-              <a:schemeClr val="lt1"/>
-            </a:fillRef>
-            <a:effectRef idx="0">
-              <a:schemeClr val="accent4"/>
-            </a:effectRef>
-            <a:fontRef idx="minor">
-              <a:schemeClr val="dk1"/>
-            </a:fontRef>
-          </p:style>
-        </p:sp>
-        <p:sp>
-          <p:nvSpPr>
-            <p:cNvPr id="79" name="Rectangle: Rounded Corners 4">
-              <a:extLst>
-                <a:ext uri="{FF2B5EF4-FFF2-40B4-BE49-F238E27FC236}">
-                  <a16:creationId xmlns:a16="http://schemas.microsoft.com/office/drawing/2014/main" id="{CC11FBDA-0F4F-4B8F-94E5-5EC77297A23F}"/>
-                </a:ext>
-              </a:extLst>
-            </p:cNvPr>
-            <p:cNvSpPr txBox="1"/>
-            <p:nvPr/>
-          </p:nvSpPr>
-          <p:spPr>
-            <a:xfrm>
-              <a:off x="57787" y="1395494"/>
-              <a:ext cx="2665308" cy="1560349"/>
-            </a:xfrm>
-            <a:prstGeom prst="rect">
-              <a:avLst/>
-            </a:prstGeom>
-          </p:spPr>
-          <p:style>
-            <a:lnRef idx="2">
-              <a:schemeClr val="accent4"/>
-            </a:lnRef>
-            <a:fillRef idx="1">
-              <a:schemeClr val="lt1"/>
-            </a:fillRef>
-            <a:effectRef idx="0">
-              <a:schemeClr val="accent4"/>
-            </a:effectRef>
-            <a:fontRef idx="minor">
-              <a:schemeClr val="dk1"/>
-            </a:fontRef>
-          </p:style>
-          <p:txBody>
-            <a:bodyPr spcFirstLastPara="0" vert="horz" wrap="square" lIns="247650" tIns="247650" rIns="247650" bIns="247650" numCol="1" spcCol="1270" anchor="ctr" anchorCtr="0">
-              <a:noAutofit/>
-            </a:bodyPr>
-            <a:lstStyle/>
-            <a:p>
-              <a:pPr marL="0" lvl="0" indent="0" algn="ctr" defTabSz="2889250">
-                <a:lnSpc>
-                  <a:spcPct val="90000"/>
-                </a:lnSpc>
-                <a:spcBef>
-                  <a:spcPct val="0"/>
-                </a:spcBef>
-                <a:spcAft>
-                  <a:spcPct val="35000"/>
-                </a:spcAft>
-                <a:buNone/>
-              </a:pPr>
-              <a:r>
-                <a:rPr lang="vi-VN" sz="2000" kern="1200" dirty="0"/>
-                <a:t>Train set</a:t>
-              </a:r>
-              <a:endParaRPr lang="en-US" sz="2000" kern="1200" dirty="0"/>
-            </a:p>
-          </p:txBody>
-        </p:sp>
-      </p:grpSp>
-      <p:grpSp>
-        <p:nvGrpSpPr>
-          <p:cNvPr id="80" name="Group 79">
+          <a:prstGeom prst="roundRect">
+            <a:avLst>
+              <a:gd name="adj" fmla="val 10000"/>
+            </a:avLst>
+          </a:prstGeom>
+        </p:spPr>
+        <p:style>
+          <a:lnRef idx="2">
+            <a:schemeClr val="accent4"/>
+          </a:lnRef>
+          <a:fillRef idx="1">
+            <a:schemeClr val="lt1"/>
+          </a:fillRef>
+          <a:effectRef idx="0">
+            <a:schemeClr val="accent4"/>
+          </a:effectRef>
+          <a:fontRef idx="minor">
+            <a:schemeClr val="dk1"/>
+          </a:fontRef>
+        </p:style>
+        <p:txBody>
+          <a:bodyPr/>
+          <a:lstStyle/>
+          <a:p>
+            <a:pPr algn="ctr"/>
+            <a:r>
+              <a:rPr lang="vi-VN" sz="1800" kern="1200" dirty="0"/>
+              <a:t>Train set </a:t>
+            </a:r>
+            <a:r>
+              <a:rPr lang="vi-VN" sz="1600" kern="1200" dirty="0"/>
+              <a:t>(60%)</a:t>
+            </a:r>
+            <a:endParaRPr lang="en-US" sz="2400" kern="1200" dirty="0"/>
+          </a:p>
+          <a:p>
+            <a:endParaRPr lang="en-US" dirty="0"/>
+          </a:p>
+        </p:txBody>
+      </p:sp>
+      <p:sp>
+        <p:nvSpPr>
+          <p:cNvPr id="81" name="Rectangle: Rounded Corners 80">
             <a:extLst>
               <a:ext uri="{FF2B5EF4-FFF2-40B4-BE49-F238E27FC236}">
-                <a16:creationId xmlns:a16="http://schemas.microsoft.com/office/drawing/2014/main" id="{4FBBD27A-3425-4C59-9817-3D810CDA7FC6}"/>
+                <a16:creationId xmlns:a16="http://schemas.microsoft.com/office/drawing/2014/main" id="{2D137453-4556-4CD7-96B8-D5746CA67ECF}"/>
               </a:ext>
             </a:extLst>
           </p:cNvPr>
-          <p:cNvGrpSpPr/>
+          <p:cNvSpPr/>
           <p:nvPr/>
-        </p:nvGrpSpPr>
-        <p:grpSpPr>
+        </p:nvSpPr>
+        <p:spPr>
           <a:xfrm>
             <a:off x="1975826" y="3777774"/>
             <a:ext cx="1218952" cy="872997"/>
-            <a:chOff x="9242" y="1346949"/>
-            <a:chExt cx="2762398" cy="1657439"/>
           </a:xfrm>
-        </p:grpSpPr>
-        <p:sp>
-          <p:nvSpPr>
-            <p:cNvPr id="81" name="Rectangle: Rounded Corners 80">
-              <a:extLst>
-                <a:ext uri="{FF2B5EF4-FFF2-40B4-BE49-F238E27FC236}">
-                  <a16:creationId xmlns:a16="http://schemas.microsoft.com/office/drawing/2014/main" id="{2D137453-4556-4CD7-96B8-D5746CA67ECF}"/>
-                </a:ext>
-              </a:extLst>
-            </p:cNvPr>
-            <p:cNvSpPr/>
-            <p:nvPr/>
-          </p:nvSpPr>
-          <p:spPr>
-            <a:xfrm>
-              <a:off x="9242" y="1346949"/>
-              <a:ext cx="2762398" cy="1657439"/>
-            </a:xfrm>
-            <a:prstGeom prst="roundRect">
-              <a:avLst>
-                <a:gd name="adj" fmla="val 10000"/>
-              </a:avLst>
-            </a:prstGeom>
-          </p:spPr>
-          <p:style>
-            <a:lnRef idx="2">
-              <a:schemeClr val="accent4"/>
-            </a:lnRef>
-            <a:fillRef idx="1">
-              <a:schemeClr val="lt1"/>
-            </a:fillRef>
-            <a:effectRef idx="0">
-              <a:schemeClr val="accent4"/>
-            </a:effectRef>
-            <a:fontRef idx="minor">
-              <a:schemeClr val="dk1"/>
-            </a:fontRef>
-          </p:style>
-        </p:sp>
-        <p:sp>
-          <p:nvSpPr>
-            <p:cNvPr id="82" name="Rectangle: Rounded Corners 4">
-              <a:extLst>
-                <a:ext uri="{FF2B5EF4-FFF2-40B4-BE49-F238E27FC236}">
-                  <a16:creationId xmlns:a16="http://schemas.microsoft.com/office/drawing/2014/main" id="{760B5CEF-435B-4DB1-BB78-35A375AB2BC1}"/>
-                </a:ext>
-              </a:extLst>
-            </p:cNvPr>
-            <p:cNvSpPr txBox="1"/>
-            <p:nvPr/>
-          </p:nvSpPr>
-          <p:spPr>
-            <a:xfrm>
-              <a:off x="57787" y="1395494"/>
-              <a:ext cx="2665308" cy="1560349"/>
-            </a:xfrm>
-            <a:prstGeom prst="rect">
-              <a:avLst/>
-            </a:prstGeom>
-          </p:spPr>
-          <p:style>
-            <a:lnRef idx="2">
-              <a:schemeClr val="accent4"/>
-            </a:lnRef>
-            <a:fillRef idx="1">
-              <a:schemeClr val="lt1"/>
-            </a:fillRef>
-            <a:effectRef idx="0">
-              <a:schemeClr val="accent4"/>
-            </a:effectRef>
-            <a:fontRef idx="minor">
-              <a:schemeClr val="dk1"/>
-            </a:fontRef>
-          </p:style>
-          <p:txBody>
-            <a:bodyPr spcFirstLastPara="0" vert="horz" wrap="square" lIns="247650" tIns="247650" rIns="247650" bIns="247650" numCol="1" spcCol="1270" anchor="ctr" anchorCtr="0">
-              <a:noAutofit/>
-            </a:bodyPr>
-            <a:lstStyle/>
-            <a:p>
-              <a:pPr marL="0" lvl="0" indent="0" algn="ctr" defTabSz="2889250">
-                <a:lnSpc>
-                  <a:spcPct val="90000"/>
-                </a:lnSpc>
-                <a:spcBef>
-                  <a:spcPct val="0"/>
-                </a:spcBef>
-                <a:spcAft>
-                  <a:spcPct val="35000"/>
-                </a:spcAft>
-                <a:buNone/>
-              </a:pPr>
-              <a:r>
-                <a:rPr lang="vi-VN" sz="2000" kern="1200" dirty="0"/>
-                <a:t>Test set</a:t>
-              </a:r>
-              <a:endParaRPr lang="en-US" sz="2000" kern="1200" dirty="0"/>
-            </a:p>
-          </p:txBody>
-        </p:sp>
-      </p:grpSp>
-      <p:grpSp>
-        <p:nvGrpSpPr>
-          <p:cNvPr id="83" name="Group 82">
+          <a:prstGeom prst="roundRect">
+            <a:avLst>
+              <a:gd name="adj" fmla="val 10000"/>
+            </a:avLst>
+          </a:prstGeom>
+        </p:spPr>
+        <p:style>
+          <a:lnRef idx="2">
+            <a:schemeClr val="accent4"/>
+          </a:lnRef>
+          <a:fillRef idx="1">
+            <a:schemeClr val="lt1"/>
+          </a:fillRef>
+          <a:effectRef idx="0">
+            <a:schemeClr val="accent4"/>
+          </a:effectRef>
+          <a:fontRef idx="minor">
+            <a:schemeClr val="dk1"/>
+          </a:fontRef>
+        </p:style>
+        <p:txBody>
+          <a:bodyPr/>
+          <a:lstStyle/>
+          <a:p>
+            <a:pPr marL="0" lvl="0" indent="0" algn="ctr" defTabSz="2889250">
+              <a:lnSpc>
+                <a:spcPct val="90000"/>
+              </a:lnSpc>
+              <a:spcBef>
+                <a:spcPct val="0"/>
+              </a:spcBef>
+              <a:spcAft>
+                <a:spcPct val="35000"/>
+              </a:spcAft>
+              <a:buNone/>
+            </a:pPr>
+            <a:r>
+              <a:rPr lang="vi-VN" sz="1800" kern="1200" dirty="0"/>
+              <a:t>Test set</a:t>
+            </a:r>
+          </a:p>
+          <a:p>
+            <a:pPr marL="0" lvl="0" indent="0" algn="ctr" defTabSz="2889250">
+              <a:lnSpc>
+                <a:spcPct val="90000"/>
+              </a:lnSpc>
+              <a:spcBef>
+                <a:spcPct val="0"/>
+              </a:spcBef>
+              <a:spcAft>
+                <a:spcPct val="35000"/>
+              </a:spcAft>
+              <a:buNone/>
+            </a:pPr>
+            <a:r>
+              <a:rPr lang="vi-VN" sz="1600" dirty="0"/>
+              <a:t>(20%)</a:t>
+            </a:r>
+            <a:endParaRPr lang="en-US" sz="2400" kern="1200" dirty="0"/>
+          </a:p>
+          <a:p>
+            <a:endParaRPr lang="en-US" dirty="0"/>
+          </a:p>
+        </p:txBody>
+      </p:sp>
+      <p:sp>
+        <p:nvSpPr>
+          <p:cNvPr id="84" name="Rectangle: Rounded Corners 83">
             <a:extLst>
               <a:ext uri="{FF2B5EF4-FFF2-40B4-BE49-F238E27FC236}">
-                <a16:creationId xmlns:a16="http://schemas.microsoft.com/office/drawing/2014/main" id="{2633100D-F100-486C-8C47-4BDD9200D9A5}"/>
+                <a16:creationId xmlns:a16="http://schemas.microsoft.com/office/drawing/2014/main" id="{EF7DDE7C-90EE-4BDA-ABE4-98745F317FD3}"/>
               </a:ext>
             </a:extLst>
           </p:cNvPr>
-          <p:cNvGrpSpPr/>
+          <p:cNvSpPr/>
           <p:nvPr/>
-        </p:nvGrpSpPr>
-        <p:grpSpPr>
+        </p:nvSpPr>
+        <p:spPr>
           <a:xfrm>
             <a:off x="1975825" y="4870441"/>
             <a:ext cx="1218952" cy="872997"/>
-            <a:chOff x="9242" y="1346949"/>
-            <a:chExt cx="2762398" cy="1657439"/>
           </a:xfrm>
-        </p:grpSpPr>
-        <p:sp>
-          <p:nvSpPr>
-            <p:cNvPr id="84" name="Rectangle: Rounded Corners 83">
-              <a:extLst>
-                <a:ext uri="{FF2B5EF4-FFF2-40B4-BE49-F238E27FC236}">
-                  <a16:creationId xmlns:a16="http://schemas.microsoft.com/office/drawing/2014/main" id="{EF7DDE7C-90EE-4BDA-ABE4-98745F317FD3}"/>
-                </a:ext>
-              </a:extLst>
-            </p:cNvPr>
-            <p:cNvSpPr/>
-            <p:nvPr/>
-          </p:nvSpPr>
-          <p:spPr>
-            <a:xfrm>
-              <a:off x="9242" y="1346949"/>
-              <a:ext cx="2762398" cy="1657439"/>
-            </a:xfrm>
-            <a:prstGeom prst="roundRect">
-              <a:avLst>
-                <a:gd name="adj" fmla="val 10000"/>
-              </a:avLst>
-            </a:prstGeom>
-          </p:spPr>
-          <p:style>
-            <a:lnRef idx="2">
-              <a:schemeClr val="accent4"/>
-            </a:lnRef>
-            <a:fillRef idx="1">
-              <a:schemeClr val="lt1"/>
-            </a:fillRef>
-            <a:effectRef idx="0">
-              <a:schemeClr val="accent4"/>
-            </a:effectRef>
-            <a:fontRef idx="minor">
-              <a:schemeClr val="dk1"/>
-            </a:fontRef>
-          </p:style>
-        </p:sp>
-        <p:sp>
-          <p:nvSpPr>
-            <p:cNvPr id="85" name="Rectangle: Rounded Corners 4">
-              <a:extLst>
-                <a:ext uri="{FF2B5EF4-FFF2-40B4-BE49-F238E27FC236}">
-                  <a16:creationId xmlns:a16="http://schemas.microsoft.com/office/drawing/2014/main" id="{EE4FCAF7-927A-4D32-B0E3-7116F037DD39}"/>
-                </a:ext>
-              </a:extLst>
-            </p:cNvPr>
-            <p:cNvSpPr txBox="1"/>
-            <p:nvPr/>
-          </p:nvSpPr>
-          <p:spPr>
-            <a:xfrm>
-              <a:off x="57787" y="1395494"/>
-              <a:ext cx="2665308" cy="1560349"/>
-            </a:xfrm>
-            <a:prstGeom prst="rect">
-              <a:avLst/>
-            </a:prstGeom>
-          </p:spPr>
-          <p:style>
-            <a:lnRef idx="2">
-              <a:schemeClr val="accent4"/>
-            </a:lnRef>
-            <a:fillRef idx="1">
-              <a:schemeClr val="lt1"/>
-            </a:fillRef>
-            <a:effectRef idx="0">
-              <a:schemeClr val="accent4"/>
-            </a:effectRef>
-            <a:fontRef idx="minor">
-              <a:schemeClr val="dk1"/>
-            </a:fontRef>
-          </p:style>
-          <p:txBody>
-            <a:bodyPr spcFirstLastPara="0" vert="horz" wrap="square" lIns="247650" tIns="247650" rIns="247650" bIns="247650" numCol="1" spcCol="1270" anchor="ctr" anchorCtr="0">
-              <a:noAutofit/>
-            </a:bodyPr>
-            <a:lstStyle/>
-            <a:p>
-              <a:pPr marL="0" lvl="0" indent="0" algn="ctr" defTabSz="2889250">
-                <a:lnSpc>
-                  <a:spcPct val="90000"/>
-                </a:lnSpc>
-                <a:spcBef>
-                  <a:spcPct val="0"/>
-                </a:spcBef>
-                <a:spcAft>
-                  <a:spcPct val="35000"/>
-                </a:spcAft>
-                <a:buNone/>
-              </a:pPr>
-              <a:r>
-                <a:rPr lang="vi-VN" sz="2000" kern="1200" dirty="0"/>
-                <a:t>CV set</a:t>
-              </a:r>
-              <a:endParaRPr lang="en-US" sz="2000" kern="1200" dirty="0"/>
-            </a:p>
-          </p:txBody>
-        </p:sp>
-      </p:grpSp>
+          <a:prstGeom prst="roundRect">
+            <a:avLst>
+              <a:gd name="adj" fmla="val 10000"/>
+            </a:avLst>
+          </a:prstGeom>
+        </p:spPr>
+        <p:style>
+          <a:lnRef idx="2">
+            <a:schemeClr val="accent4"/>
+          </a:lnRef>
+          <a:fillRef idx="1">
+            <a:schemeClr val="lt1"/>
+          </a:fillRef>
+          <a:effectRef idx="0">
+            <a:schemeClr val="accent4"/>
+          </a:effectRef>
+          <a:fontRef idx="minor">
+            <a:schemeClr val="dk1"/>
+          </a:fontRef>
+        </p:style>
+        <p:txBody>
+          <a:bodyPr/>
+          <a:lstStyle/>
+          <a:p>
+            <a:pPr marL="0" lvl="0" indent="0" algn="ctr" defTabSz="2889250">
+              <a:lnSpc>
+                <a:spcPct val="90000"/>
+              </a:lnSpc>
+              <a:spcBef>
+                <a:spcPct val="0"/>
+              </a:spcBef>
+              <a:spcAft>
+                <a:spcPct val="35000"/>
+              </a:spcAft>
+              <a:buNone/>
+            </a:pPr>
+            <a:r>
+              <a:rPr lang="vi-VN" sz="1800" kern="1200" dirty="0"/>
+              <a:t>CV set</a:t>
+            </a:r>
+          </a:p>
+          <a:p>
+            <a:pPr marL="0" lvl="0" indent="0" algn="ctr" defTabSz="2889250">
+              <a:lnSpc>
+                <a:spcPct val="90000"/>
+              </a:lnSpc>
+              <a:spcBef>
+                <a:spcPct val="0"/>
+              </a:spcBef>
+              <a:spcAft>
+                <a:spcPct val="35000"/>
+              </a:spcAft>
+              <a:buNone/>
+            </a:pPr>
+            <a:r>
+              <a:rPr lang="vi-VN" sz="1600" dirty="0"/>
+              <a:t>(20%)</a:t>
+            </a:r>
+            <a:endParaRPr lang="en-US" sz="2400" kern="1200" dirty="0"/>
+          </a:p>
+          <a:p>
+            <a:endParaRPr lang="en-US" dirty="0"/>
+          </a:p>
+        </p:txBody>
+      </p:sp>
       <p:cxnSp>
         <p:nvCxnSpPr>
           <p:cNvPr id="90" name="Straight Arrow Connector 89">
@@ -23337,8 +22612,8 @@
             </a:extLst>
           </p:cNvPr>
           <p:cNvCxnSpPr>
+            <a:cxnSpLocks/>
             <a:stCxn id="19" idx="3"/>
-            <a:endCxn id="79" idx="1"/>
           </p:cNvCxnSpPr>
           <p:nvPr/>
         </p:nvCxnSpPr>
@@ -23381,7 +22656,6 @@
           <p:cNvCxnSpPr>
             <a:cxnSpLocks/>
             <a:stCxn id="20" idx="3"/>
-            <a:endCxn id="82" idx="1"/>
           </p:cNvCxnSpPr>
           <p:nvPr/>
         </p:nvCxnSpPr>
@@ -23424,7 +22698,6 @@
           <p:cNvCxnSpPr>
             <a:cxnSpLocks/>
             <a:stCxn id="20" idx="3"/>
-            <a:endCxn id="85" idx="1"/>
           </p:cNvCxnSpPr>
           <p:nvPr/>
         </p:nvCxnSpPr>
@@ -23589,8 +22862,8 @@
         </p:nvGrpSpPr>
         <p:grpSpPr>
           <a:xfrm rot="1758002">
-            <a:off x="3164093" y="3174030"/>
-            <a:ext cx="1092032" cy="615370"/>
+            <a:off x="3246582" y="3195593"/>
+            <a:ext cx="1003906" cy="615370"/>
             <a:chOff x="3045460" y="1833131"/>
             <a:chExt cx="588048" cy="685074"/>
           </a:xfrm>
@@ -24130,8 +23403,8 @@
         </p:nvCxnSpPr>
         <p:spPr>
           <a:xfrm>
-            <a:off x="8163467" y="2985814"/>
-            <a:ext cx="3108450" cy="758010"/>
+            <a:off x="8215188" y="3041550"/>
+            <a:ext cx="3056729" cy="702274"/>
           </a:xfrm>
           <a:prstGeom prst="straightConnector1">
             <a:avLst/>
@@ -24166,14 +23439,15 @@
           </p:cNvPr>
           <p:cNvCxnSpPr>
             <a:cxnSpLocks/>
+            <a:stCxn id="47" idx="3"/>
             <a:endCxn id="126" idx="1"/>
           </p:cNvCxnSpPr>
           <p:nvPr/>
         </p:nvCxnSpPr>
         <p:spPr>
-          <a:xfrm flipV="1">
-            <a:off x="9690675" y="4178221"/>
-            <a:ext cx="814136" cy="21797"/>
+          <a:xfrm>
+            <a:off x="10233590" y="4169748"/>
+            <a:ext cx="271221" cy="8473"/>
           </a:xfrm>
           <a:prstGeom prst="straightConnector1">
             <a:avLst/>
@@ -24211,8 +23485,8 @@
         </p:nvSpPr>
         <p:spPr>
           <a:xfrm>
-            <a:off x="9680324" y="4965867"/>
-            <a:ext cx="924489" cy="618057"/>
+            <a:off x="9845424" y="5039866"/>
+            <a:ext cx="980077" cy="558065"/>
           </a:xfrm>
           <a:prstGeom prst="roundRect">
             <a:avLst>
@@ -24249,74 +23523,72 @@
             <a:schemeClr val="lt1"/>
           </a:fontRef>
         </p:style>
+        <p:txBody>
+          <a:bodyPr/>
+          <a:lstStyle/>
+          <a:p>
+            <a:pPr algn="ctr"/>
+            <a:r>
+              <a:rPr lang="vi-VN" sz="1400" kern="1200" dirty="0"/>
+              <a:t>Standard Scaler</a:t>
+            </a:r>
+            <a:endParaRPr lang="en-US" sz="1400" kern="1200" dirty="0"/>
+          </a:p>
+          <a:p>
+            <a:pPr algn="ctr"/>
+            <a:endParaRPr lang="en-US" sz="1400" dirty="0"/>
+          </a:p>
+        </p:txBody>
       </p:sp>
-      <p:sp>
-        <p:nvSpPr>
-          <p:cNvPr id="74" name="Rectangle: Rounded Corners 4">
+      <p:cxnSp>
+        <p:nvCxnSpPr>
+          <p:cNvPr id="141" name="Straight Arrow Connector 140">
             <a:extLst>
               <a:ext uri="{FF2B5EF4-FFF2-40B4-BE49-F238E27FC236}">
-                <a16:creationId xmlns:a16="http://schemas.microsoft.com/office/drawing/2014/main" id="{B677A1C4-16A4-44A8-9B5F-8809109D0AC4}"/>
+                <a16:creationId xmlns:a16="http://schemas.microsoft.com/office/drawing/2014/main" id="{F1AB77D9-7148-4926-962B-4B87EE9E37F9}"/>
               </a:ext>
             </a:extLst>
           </p:cNvPr>
-          <p:cNvSpPr txBox="1"/>
+          <p:cNvCxnSpPr>
+            <a:cxnSpLocks/>
+            <a:stCxn id="73" idx="3"/>
+            <a:endCxn id="125" idx="2"/>
+          </p:cNvCxnSpPr>
           <p:nvPr/>
-        </p:nvSpPr>
+        </p:nvCxnSpPr>
         <p:spPr>
-          <a:xfrm>
-            <a:off x="9546184" y="4911352"/>
-            <a:ext cx="1203037" cy="768680"/>
+          <a:xfrm flipV="1">
+            <a:off x="10825501" y="4612617"/>
+            <a:ext cx="446416" cy="706282"/>
           </a:xfrm>
-          <a:prstGeom prst="rect">
+          <a:prstGeom prst="straightConnector1">
             <a:avLst/>
           </a:prstGeom>
+          <a:ln>
+            <a:tailEnd type="triangle"/>
+          </a:ln>
         </p:spPr>
         <p:style>
-          <a:lnRef idx="0">
-            <a:scrgbClr r="0" g="0" b="0"/>
+          <a:lnRef idx="3">
+            <a:schemeClr val="accent1"/>
           </a:lnRef>
           <a:fillRef idx="0">
-            <a:scrgbClr r="0" g="0" b="0"/>
+            <a:schemeClr val="accent1"/>
           </a:fillRef>
-          <a:effectRef idx="0">
-            <a:scrgbClr r="0" g="0" b="0"/>
+          <a:effectRef idx="2">
+            <a:schemeClr val="accent1"/>
           </a:effectRef>
           <a:fontRef idx="minor">
-            <a:schemeClr val="lt1"/>
+            <a:schemeClr val="tx1"/>
           </a:fontRef>
         </p:style>
-        <p:txBody>
-          <a:bodyPr spcFirstLastPara="0" vert="horz" wrap="square" lIns="76200" tIns="76200" rIns="76200" bIns="76200" numCol="1" spcCol="1270" anchor="ctr" anchorCtr="0">
-            <a:noAutofit/>
-          </a:bodyPr>
-          <a:lstStyle/>
-          <a:p>
-            <a:pPr marL="0" lvl="0" indent="0" algn="ctr" defTabSz="889000">
-              <a:lnSpc>
-                <a:spcPct val="90000"/>
-              </a:lnSpc>
-              <a:spcBef>
-                <a:spcPct val="0"/>
-              </a:spcBef>
-              <a:spcAft>
-                <a:spcPct val="35000"/>
-              </a:spcAft>
-              <a:buNone/>
-            </a:pPr>
-            <a:r>
-              <a:rPr lang="vi-VN" sz="1600" kern="1200" dirty="0"/>
-              <a:t>Standard Scaler</a:t>
-            </a:r>
-            <a:endParaRPr lang="en-US" sz="1600" kern="1200" dirty="0"/>
-          </a:p>
-        </p:txBody>
-      </p:sp>
+      </p:cxnSp>
       <p:sp>
         <p:nvSpPr>
-          <p:cNvPr id="139" name="Arrow: Right 138">
+          <p:cNvPr id="95" name="Arrow: Right 94">
             <a:extLst>
               <a:ext uri="{FF2B5EF4-FFF2-40B4-BE49-F238E27FC236}">
-                <a16:creationId xmlns:a16="http://schemas.microsoft.com/office/drawing/2014/main" id="{8F29D2AF-15D7-4352-BF4F-476AABE54F8D}"/>
+                <a16:creationId xmlns:a16="http://schemas.microsoft.com/office/drawing/2014/main" id="{C7ED2484-A01F-4FB8-9028-CF93B7936C0F}"/>
               </a:ext>
             </a:extLst>
           </p:cNvPr>
@@ -24325,7 +23597,199 @@
         </p:nvSpPr>
         <p:spPr>
           <a:xfrm>
-            <a:off x="9161945" y="5104659"/>
+            <a:off x="7287062" y="4042818"/>
+            <a:ext cx="359850" cy="310145"/>
+          </a:xfrm>
+          <a:prstGeom prst="rightArrow">
+            <a:avLst>
+              <a:gd name="adj1" fmla="val 60000"/>
+              <a:gd name="adj2" fmla="val 50000"/>
+            </a:avLst>
+          </a:prstGeom>
+        </p:spPr>
+        <p:style>
+          <a:lnRef idx="0">
+            <a:schemeClr val="accent1">
+              <a:tint val="60000"/>
+              <a:hueOff val="0"/>
+              <a:satOff val="0"/>
+              <a:lumOff val="0"/>
+              <a:alphaOff val="0"/>
+            </a:schemeClr>
+          </a:lnRef>
+          <a:fillRef idx="1">
+            <a:schemeClr val="accent1">
+              <a:tint val="60000"/>
+              <a:hueOff val="0"/>
+              <a:satOff val="0"/>
+              <a:lumOff val="0"/>
+              <a:alphaOff val="0"/>
+            </a:schemeClr>
+          </a:fillRef>
+          <a:effectRef idx="0">
+            <a:schemeClr val="accent1">
+              <a:tint val="60000"/>
+              <a:hueOff val="0"/>
+              <a:satOff val="0"/>
+              <a:lumOff val="0"/>
+              <a:alphaOff val="0"/>
+            </a:schemeClr>
+          </a:effectRef>
+          <a:fontRef idx="minor">
+            <a:schemeClr val="lt1"/>
+          </a:fontRef>
+        </p:style>
+      </p:sp>
+      <p:sp>
+        <p:nvSpPr>
+          <p:cNvPr id="53" name="Arrow: Right 52">
+            <a:extLst>
+              <a:ext uri="{FF2B5EF4-FFF2-40B4-BE49-F238E27FC236}">
+                <a16:creationId xmlns:a16="http://schemas.microsoft.com/office/drawing/2014/main" id="{8E5853D8-AAC6-4797-99B8-D29921D9DA9C}"/>
+              </a:ext>
+            </a:extLst>
+          </p:cNvPr>
+          <p:cNvSpPr/>
+          <p:nvPr/>
+        </p:nvSpPr>
+        <p:spPr>
+          <a:xfrm>
+            <a:off x="8888748" y="4052072"/>
+            <a:ext cx="359850" cy="310145"/>
+          </a:xfrm>
+          <a:prstGeom prst="rightArrow">
+            <a:avLst>
+              <a:gd name="adj1" fmla="val 60000"/>
+              <a:gd name="adj2" fmla="val 50000"/>
+            </a:avLst>
+          </a:prstGeom>
+        </p:spPr>
+        <p:style>
+          <a:lnRef idx="0">
+            <a:schemeClr val="accent1">
+              <a:tint val="60000"/>
+              <a:hueOff val="0"/>
+              <a:satOff val="0"/>
+              <a:lumOff val="0"/>
+              <a:alphaOff val="0"/>
+            </a:schemeClr>
+          </a:lnRef>
+          <a:fillRef idx="1">
+            <a:schemeClr val="accent1">
+              <a:tint val="60000"/>
+              <a:hueOff val="0"/>
+              <a:satOff val="0"/>
+              <a:lumOff val="0"/>
+              <a:alphaOff val="0"/>
+            </a:schemeClr>
+          </a:fillRef>
+          <a:effectRef idx="0">
+            <a:schemeClr val="accent1">
+              <a:tint val="60000"/>
+              <a:hueOff val="0"/>
+              <a:satOff val="0"/>
+              <a:lumOff val="0"/>
+              <a:alphaOff val="0"/>
+            </a:schemeClr>
+          </a:effectRef>
+          <a:fontRef idx="minor">
+            <a:schemeClr val="lt1"/>
+          </a:fontRef>
+        </p:style>
+      </p:sp>
+      <p:sp>
+        <p:nvSpPr>
+          <p:cNvPr id="54" name="Rectangle: Rounded Corners 53">
+            <a:extLst>
+              <a:ext uri="{FF2B5EF4-FFF2-40B4-BE49-F238E27FC236}">
+                <a16:creationId xmlns:a16="http://schemas.microsoft.com/office/drawing/2014/main" id="{A0329F54-5D4E-4C15-BC09-E0AB2AAFD463}"/>
+              </a:ext>
+            </a:extLst>
+          </p:cNvPr>
+          <p:cNvSpPr/>
+          <p:nvPr/>
+        </p:nvSpPr>
+        <p:spPr>
+          <a:xfrm>
+            <a:off x="8080758" y="5006135"/>
+            <a:ext cx="1095588" cy="625526"/>
+          </a:xfrm>
+          <a:prstGeom prst="roundRect">
+            <a:avLst>
+              <a:gd name="adj" fmla="val 10000"/>
+            </a:avLst>
+          </a:prstGeom>
+        </p:spPr>
+        <p:style>
+          <a:lnRef idx="2">
+            <a:schemeClr val="lt1">
+              <a:hueOff val="0"/>
+              <a:satOff val="0"/>
+              <a:lumOff val="0"/>
+              <a:alphaOff val="0"/>
+            </a:schemeClr>
+          </a:lnRef>
+          <a:fillRef idx="1">
+            <a:schemeClr val="accent1">
+              <a:hueOff val="0"/>
+              <a:satOff val="0"/>
+              <a:lumOff val="0"/>
+              <a:alphaOff val="0"/>
+            </a:schemeClr>
+          </a:fillRef>
+          <a:effectRef idx="0">
+            <a:schemeClr val="accent1">
+              <a:hueOff val="0"/>
+              <a:satOff val="0"/>
+              <a:lumOff val="0"/>
+              <a:alphaOff val="0"/>
+            </a:schemeClr>
+          </a:effectRef>
+          <a:fontRef idx="minor">
+            <a:schemeClr val="lt1"/>
+          </a:fontRef>
+        </p:style>
+        <p:txBody>
+          <a:bodyPr/>
+          <a:lstStyle/>
+          <a:p>
+            <a:pPr algn="ctr"/>
+            <a:r>
+              <a:rPr lang="en-US" sz="1400" dirty="0">
+                <a:latin typeface="Arial" panose="020B0604020202020204" pitchFamily="34" charset="0"/>
+                <a:cs typeface="Arial" panose="020B0604020202020204" pitchFamily="34" charset="0"/>
+              </a:rPr>
+              <a:t>One hot encoder</a:t>
+            </a:r>
+            <a:endParaRPr lang="vi-VN" sz="1400" dirty="0">
+              <a:latin typeface="Arial" panose="020B0604020202020204" pitchFamily="34" charset="0"/>
+              <a:cs typeface="Arial" panose="020B0604020202020204" pitchFamily="34" charset="0"/>
+            </a:endParaRPr>
+          </a:p>
+          <a:p>
+            <a:pPr algn="ctr"/>
+            <a:endParaRPr lang="en-US" sz="1400" dirty="0">
+              <a:latin typeface="Arial" panose="020B0604020202020204" pitchFamily="34" charset="0"/>
+              <a:cs typeface="Arial" panose="020B0604020202020204" pitchFamily="34" charset="0"/>
+            </a:endParaRPr>
+          </a:p>
+        </p:txBody>
+      </p:sp>
+      <p:sp>
+        <p:nvSpPr>
+          <p:cNvPr id="55" name="Arrow: Right 54">
+            <a:extLst>
+              <a:ext uri="{FF2B5EF4-FFF2-40B4-BE49-F238E27FC236}">
+                <a16:creationId xmlns:a16="http://schemas.microsoft.com/office/drawing/2014/main" id="{31C2E6B6-F99B-4882-A29A-C762841C3446}"/>
+              </a:ext>
+            </a:extLst>
+          </p:cNvPr>
+          <p:cNvSpPr/>
+          <p:nvPr/>
+        </p:nvSpPr>
+        <p:spPr>
+          <a:xfrm>
+            <a:off x="9273332" y="5148877"/>
             <a:ext cx="475105" cy="345106"/>
           </a:xfrm>
           <a:prstGeom prst="rightArrow">
@@ -24368,48 +23832,6 @@
           </a:fontRef>
         </p:style>
       </p:sp>
-      <p:cxnSp>
-        <p:nvCxnSpPr>
-          <p:cNvPr id="141" name="Straight Arrow Connector 140">
-            <a:extLst>
-              <a:ext uri="{FF2B5EF4-FFF2-40B4-BE49-F238E27FC236}">
-                <a16:creationId xmlns:a16="http://schemas.microsoft.com/office/drawing/2014/main" id="{F1AB77D9-7148-4926-962B-4B87EE9E37F9}"/>
-              </a:ext>
-            </a:extLst>
-          </p:cNvPr>
-          <p:cNvCxnSpPr>
-            <a:cxnSpLocks/>
-            <a:endCxn id="125" idx="2"/>
-          </p:cNvCxnSpPr>
-          <p:nvPr/>
-        </p:nvCxnSpPr>
-        <p:spPr>
-          <a:xfrm flipV="1">
-            <a:off x="10604813" y="4612617"/>
-            <a:ext cx="667104" cy="683075"/>
-          </a:xfrm>
-          <a:prstGeom prst="straightConnector1">
-            <a:avLst/>
-          </a:prstGeom>
-          <a:ln>
-            <a:tailEnd type="triangle"/>
-          </a:ln>
-        </p:spPr>
-        <p:style>
-          <a:lnRef idx="3">
-            <a:schemeClr val="accent1"/>
-          </a:lnRef>
-          <a:fillRef idx="0">
-            <a:schemeClr val="accent1"/>
-          </a:fillRef>
-          <a:effectRef idx="2">
-            <a:schemeClr val="accent1"/>
-          </a:effectRef>
-          <a:fontRef idx="minor">
-            <a:schemeClr val="tx1"/>
-          </a:fontRef>
-        </p:style>
-      </p:cxnSp>
     </p:spTree>
     <p:extLst>
       <p:ext uri="{BB962C8B-B14F-4D97-AF65-F5344CB8AC3E}">
@@ -25340,8 +24762,8 @@
           </p:txBody>
         </p:sp>
       </p:grpSp>
-      <mc:AlternateContent xmlns:mc="http://schemas.openxmlformats.org/markup-compatibility/2006">
-        <mc:Choice xmlns:a14="http://schemas.microsoft.com/office/drawing/2010/main" Requires="a14">
+      <mc:AlternateContent xmlns:mc="http://schemas.openxmlformats.org/markup-compatibility/2006" xmlns:a14="http://schemas.microsoft.com/office/drawing/2010/main">
+        <mc:Choice Requires="a14">
           <p:sp>
             <p:nvSpPr>
               <p:cNvPr id="15" name="Rectangle 2">
@@ -26160,7 +25582,7 @@
             </p:txBody>
           </p:sp>
         </mc:Choice>
-        <mc:Fallback>
+        <mc:Fallback xmlns="">
           <p:sp>
             <p:nvSpPr>
               <p:cNvPr id="15" name="Rectangle 2">

</xml_diff>